<commit_message>
Revisão geral (entrega 09/10/2022)
</commit_message>
<xml_diff>
--- a/docs/Fluxo de usuário.pptx
+++ b/docs/Fluxo de usuário.pptx
@@ -2,11 +2,11 @@
 <file path=ppt/presentation.xml><?xml version="1.0" encoding="utf-8"?>
 <p:presentation xmlns:a="http://schemas.openxmlformats.org/drawingml/2006/main" xmlns:r="http://schemas.openxmlformats.org/officeDocument/2006/relationships" xmlns:p="http://schemas.openxmlformats.org/presentationml/2006/main" saveSubsetFonts="1">
   <p:sldMasterIdLst>
-    <p:sldMasterId id="2147483660" r:id="rId1"/>
+    <p:sldMasterId id="2147483660" r:id="rId4"/>
   </p:sldMasterIdLst>
   <p:sldIdLst>
-    <p:sldId id="256" r:id="rId2"/>
-    <p:sldId id="257" r:id="rId3"/>
+    <p:sldId id="256" r:id="rId5"/>
+    <p:sldId id="257" r:id="rId6"/>
   </p:sldIdLst>
   <p:sldSz cx="12192000" cy="10817225"/>
   <p:notesSz cx="6858000" cy="9144000"/>
@@ -105,7 +105,313 @@
       </a:defRPr>
     </a:lvl9pPr>
   </p:defaultTextStyle>
+  <p:extLst>
+    <p:ext uri="{EFAFB233-063F-42B5-8137-9DF3F51BA10A}">
+      <p15:sldGuideLst xmlns:p15="http://schemas.microsoft.com/office/powerpoint/2012/main"/>
+    </p:ext>
+  </p:extLst>
 </p:presentation>
+</file>
+
+<file path=ppt/revisionInfo.xml><?xml version="1.0" encoding="utf-8"?>
+<p1510:revInfo xmlns:a="http://schemas.openxmlformats.org/drawingml/2006/main" xmlns:r="http://schemas.openxmlformats.org/officeDocument/2006/relationships" xmlns:p1510="http://schemas.microsoft.com/office/powerpoint/2015/10/main">
+  <p1510:revLst>
+    <p1510:client id="{D2BFB781-41E8-44D7-8625-CC045B935F9E}" v="17" dt="2022-10-08T02:26:24.968"/>
+  </p1510:revLst>
+</p1510:revInfo>
+</file>
+
+<file path=ppt/changesInfos/changesInfo1.xml><?xml version="1.0" encoding="utf-8"?>
+<pc:chgInfo xmlns:a="http://schemas.openxmlformats.org/drawingml/2006/main" xmlns:r="http://schemas.openxmlformats.org/officeDocument/2006/relationships" xmlns:ac="http://schemas.microsoft.com/office/drawing/2013/main/command" xmlns:pc="http://schemas.microsoft.com/office/powerpoint/2013/main/command">
+  <pc:docChgLst>
+    <pc:chgData name="Flavio Martins Da Cruz" userId="7dbe8e30-2e97-43ef-8040-520ddcc14afe" providerId="ADAL" clId="{D2BFB781-41E8-44D7-8625-CC045B935F9E}"/>
+    <pc:docChg chg="undo custSel modSld">
+      <pc:chgData name="Flavio Martins Da Cruz" userId="7dbe8e30-2e97-43ef-8040-520ddcc14afe" providerId="ADAL" clId="{D2BFB781-41E8-44D7-8625-CC045B935F9E}" dt="2022-10-08T02:27:45.907" v="175" actId="14100"/>
+      <pc:docMkLst>
+        <pc:docMk/>
+      </pc:docMkLst>
+      <pc:sldChg chg="addSp delSp modSp mod">
+        <pc:chgData name="Flavio Martins Da Cruz" userId="7dbe8e30-2e97-43ef-8040-520ddcc14afe" providerId="ADAL" clId="{D2BFB781-41E8-44D7-8625-CC045B935F9E}" dt="2022-10-08T02:27:45.907" v="175" actId="14100"/>
+        <pc:sldMkLst>
+          <pc:docMk/>
+          <pc:sldMk cId="2395916845" sldId="256"/>
+        </pc:sldMkLst>
+        <pc:spChg chg="mod">
+          <ac:chgData name="Flavio Martins Da Cruz" userId="7dbe8e30-2e97-43ef-8040-520ddcc14afe" providerId="ADAL" clId="{D2BFB781-41E8-44D7-8625-CC045B935F9E}" dt="2022-10-08T02:22:24.223" v="114" actId="20577"/>
+          <ac:spMkLst>
+            <pc:docMk/>
+            <pc:sldMk cId="2395916845" sldId="256"/>
+            <ac:spMk id="20" creationId="{9006700E-3136-B805-6711-AD13B68276DA}"/>
+          </ac:spMkLst>
+        </pc:spChg>
+        <pc:spChg chg="mod">
+          <ac:chgData name="Flavio Martins Da Cruz" userId="7dbe8e30-2e97-43ef-8040-520ddcc14afe" providerId="ADAL" clId="{D2BFB781-41E8-44D7-8625-CC045B935F9E}" dt="2022-10-08T02:27:31.419" v="171" actId="1076"/>
+          <ac:spMkLst>
+            <pc:docMk/>
+            <pc:sldMk cId="2395916845" sldId="256"/>
+            <ac:spMk id="21" creationId="{47D0D986-71CC-CB00-FC92-272AA90AC894}"/>
+          </ac:spMkLst>
+        </pc:spChg>
+        <pc:spChg chg="del">
+          <ac:chgData name="Flavio Martins Da Cruz" userId="7dbe8e30-2e97-43ef-8040-520ddcc14afe" providerId="ADAL" clId="{D2BFB781-41E8-44D7-8625-CC045B935F9E}" dt="2022-10-08T02:14:16.569" v="0" actId="478"/>
+          <ac:spMkLst>
+            <pc:docMk/>
+            <pc:sldMk cId="2395916845" sldId="256"/>
+            <ac:spMk id="39" creationId="{AB8C9557-D509-9AFA-A263-3D8B241DB654}"/>
+          </ac:spMkLst>
+        </pc:spChg>
+        <pc:grpChg chg="add del mod">
+          <ac:chgData name="Flavio Martins Da Cruz" userId="7dbe8e30-2e97-43ef-8040-520ddcc14afe" providerId="ADAL" clId="{D2BFB781-41E8-44D7-8625-CC045B935F9E}" dt="2022-10-08T02:26:24.967" v="164" actId="165"/>
+          <ac:grpSpMkLst>
+            <pc:docMk/>
+            <pc:sldMk cId="2395916845" sldId="256"/>
+            <ac:grpSpMk id="56" creationId="{28C97551-1C63-4331-2B45-423EDBA9B81E}"/>
+          </ac:grpSpMkLst>
+        </pc:grpChg>
+        <pc:grpChg chg="add del mod">
+          <ac:chgData name="Flavio Martins Da Cruz" userId="7dbe8e30-2e97-43ef-8040-520ddcc14afe" providerId="ADAL" clId="{D2BFB781-41E8-44D7-8625-CC045B935F9E}" dt="2022-10-08T02:20:43.462" v="92" actId="165"/>
+          <ac:grpSpMkLst>
+            <pc:docMk/>
+            <pc:sldMk cId="2395916845" sldId="256"/>
+            <ac:grpSpMk id="57" creationId="{F09F1FBA-DCCF-E5CB-DC32-019A19108228}"/>
+          </ac:grpSpMkLst>
+        </pc:grpChg>
+        <pc:grpChg chg="add del mod">
+          <ac:chgData name="Flavio Martins Da Cruz" userId="7dbe8e30-2e97-43ef-8040-520ddcc14afe" providerId="ADAL" clId="{D2BFB781-41E8-44D7-8625-CC045B935F9E}" dt="2022-10-08T02:23:52.907" v="133" actId="165"/>
+          <ac:grpSpMkLst>
+            <pc:docMk/>
+            <pc:sldMk cId="2395916845" sldId="256"/>
+            <ac:grpSpMk id="64" creationId="{8E7E57F3-6FD9-7362-1BD0-5B9D3AE9800F}"/>
+          </ac:grpSpMkLst>
+        </pc:grpChg>
+        <pc:picChg chg="mod">
+          <ac:chgData name="Flavio Martins Da Cruz" userId="7dbe8e30-2e97-43ef-8040-520ddcc14afe" providerId="ADAL" clId="{D2BFB781-41E8-44D7-8625-CC045B935F9E}" dt="2022-10-08T02:27:31.419" v="171" actId="1076"/>
+          <ac:picMkLst>
+            <pc:docMk/>
+            <pc:sldMk cId="2395916845" sldId="256"/>
+            <ac:picMk id="15" creationId="{BFB783C5-2A2B-F993-B6C2-2BA1FA85125D}"/>
+          </ac:picMkLst>
+        </pc:picChg>
+        <pc:cxnChg chg="add del mod">
+          <ac:chgData name="Flavio Martins Da Cruz" userId="7dbe8e30-2e97-43ef-8040-520ddcc14afe" providerId="ADAL" clId="{D2BFB781-41E8-44D7-8625-CC045B935F9E}" dt="2022-10-08T02:16:50.573" v="11" actId="478"/>
+          <ac:cxnSpMkLst>
+            <pc:docMk/>
+            <pc:sldMk cId="2395916845" sldId="256"/>
+            <ac:cxnSpMk id="10" creationId="{8C338E0E-2A42-0D50-14B5-B126252B6BA7}"/>
+          </ac:cxnSpMkLst>
+        </pc:cxnChg>
+        <pc:cxnChg chg="add del mod">
+          <ac:chgData name="Flavio Martins Da Cruz" userId="7dbe8e30-2e97-43ef-8040-520ddcc14afe" providerId="ADAL" clId="{D2BFB781-41E8-44D7-8625-CC045B935F9E}" dt="2022-10-08T02:17:35.395" v="23" actId="478"/>
+          <ac:cxnSpMkLst>
+            <pc:docMk/>
+            <pc:sldMk cId="2395916845" sldId="256"/>
+            <ac:cxnSpMk id="14" creationId="{43726265-5CA7-077F-9AE8-6CA7C6463F82}"/>
+          </ac:cxnSpMkLst>
+        </pc:cxnChg>
+        <pc:cxnChg chg="mod">
+          <ac:chgData name="Flavio Martins Da Cruz" userId="7dbe8e30-2e97-43ef-8040-520ddcc14afe" providerId="ADAL" clId="{D2BFB781-41E8-44D7-8625-CC045B935F9E}" dt="2022-10-08T02:25:53.780" v="157" actId="108"/>
+          <ac:cxnSpMkLst>
+            <pc:docMk/>
+            <pc:sldMk cId="2395916845" sldId="256"/>
+            <ac:cxnSpMk id="23" creationId="{BEDA2239-D6AB-3858-4C40-A1C8A38B45D3}"/>
+          </ac:cxnSpMkLst>
+        </pc:cxnChg>
+        <pc:cxnChg chg="mod">
+          <ac:chgData name="Flavio Martins Da Cruz" userId="7dbe8e30-2e97-43ef-8040-520ddcc14afe" providerId="ADAL" clId="{D2BFB781-41E8-44D7-8625-CC045B935F9E}" dt="2022-10-08T02:26:00.158" v="158" actId="108"/>
+          <ac:cxnSpMkLst>
+            <pc:docMk/>
+            <pc:sldMk cId="2395916845" sldId="256"/>
+            <ac:cxnSpMk id="24" creationId="{9545299F-BA75-2AAE-D04D-A2B2FF3CB2ED}"/>
+          </ac:cxnSpMkLst>
+        </pc:cxnChg>
+        <pc:cxnChg chg="mod">
+          <ac:chgData name="Flavio Martins Da Cruz" userId="7dbe8e30-2e97-43ef-8040-520ddcc14afe" providerId="ADAL" clId="{D2BFB781-41E8-44D7-8625-CC045B935F9E}" dt="2022-10-08T02:26:03.554" v="160" actId="108"/>
+          <ac:cxnSpMkLst>
+            <pc:docMk/>
+            <pc:sldMk cId="2395916845" sldId="256"/>
+            <ac:cxnSpMk id="27" creationId="{0DE54EA8-3175-B4D2-686D-F2B95C358637}"/>
+          </ac:cxnSpMkLst>
+        </pc:cxnChg>
+        <pc:cxnChg chg="mod">
+          <ac:chgData name="Flavio Martins Da Cruz" userId="7dbe8e30-2e97-43ef-8040-520ddcc14afe" providerId="ADAL" clId="{D2BFB781-41E8-44D7-8625-CC045B935F9E}" dt="2022-10-08T02:25:45.718" v="156"/>
+          <ac:cxnSpMkLst>
+            <pc:docMk/>
+            <pc:sldMk cId="2395916845" sldId="256"/>
+            <ac:cxnSpMk id="32" creationId="{74D50FA1-BF46-1308-454A-1E83526B985A}"/>
+          </ac:cxnSpMkLst>
+        </pc:cxnChg>
+        <pc:cxnChg chg="add del mod">
+          <ac:chgData name="Flavio Martins Da Cruz" userId="7dbe8e30-2e97-43ef-8040-520ddcc14afe" providerId="ADAL" clId="{D2BFB781-41E8-44D7-8625-CC045B935F9E}" dt="2022-10-08T02:18:19.509" v="38" actId="478"/>
+          <ac:cxnSpMkLst>
+            <pc:docMk/>
+            <pc:sldMk cId="2395916845" sldId="256"/>
+            <ac:cxnSpMk id="34" creationId="{985E43B5-4236-B886-3654-A51DF31B8ED5}"/>
+          </ac:cxnSpMkLst>
+        </pc:cxnChg>
+        <pc:cxnChg chg="mod">
+          <ac:chgData name="Flavio Martins Da Cruz" userId="7dbe8e30-2e97-43ef-8040-520ddcc14afe" providerId="ADAL" clId="{D2BFB781-41E8-44D7-8625-CC045B935F9E}" dt="2022-10-08T02:27:45.907" v="175" actId="14100"/>
+          <ac:cxnSpMkLst>
+            <pc:docMk/>
+            <pc:sldMk cId="2395916845" sldId="256"/>
+            <ac:cxnSpMk id="41" creationId="{ED1F6B31-E224-F767-79F9-C86050647E01}"/>
+          </ac:cxnSpMkLst>
+        </pc:cxnChg>
+        <pc:cxnChg chg="del">
+          <ac:chgData name="Flavio Martins Da Cruz" userId="7dbe8e30-2e97-43ef-8040-520ddcc14afe" providerId="ADAL" clId="{D2BFB781-41E8-44D7-8625-CC045B935F9E}" dt="2022-10-08T02:14:44.759" v="1" actId="478"/>
+          <ac:cxnSpMkLst>
+            <pc:docMk/>
+            <pc:sldMk cId="2395916845" sldId="256"/>
+            <ac:cxnSpMk id="42" creationId="{ACE855D9-3F22-5ABB-86D8-6503342BA30F}"/>
+          </ac:cxnSpMkLst>
+        </pc:cxnChg>
+        <pc:cxnChg chg="mod">
+          <ac:chgData name="Flavio Martins Da Cruz" userId="7dbe8e30-2e97-43ef-8040-520ddcc14afe" providerId="ADAL" clId="{D2BFB781-41E8-44D7-8625-CC045B935F9E}" dt="2022-10-08T02:27:01.438" v="167" actId="692"/>
+          <ac:cxnSpMkLst>
+            <pc:docMk/>
+            <pc:sldMk cId="2395916845" sldId="256"/>
+            <ac:cxnSpMk id="46" creationId="{D3D2CEB3-E802-78B1-E49E-5492AC39C1B9}"/>
+          </ac:cxnSpMkLst>
+        </pc:cxnChg>
+        <pc:cxnChg chg="add mod topLvl">
+          <ac:chgData name="Flavio Martins Da Cruz" userId="7dbe8e30-2e97-43ef-8040-520ddcc14afe" providerId="ADAL" clId="{D2BFB781-41E8-44D7-8625-CC045B935F9E}" dt="2022-10-08T02:26:24.967" v="164" actId="165"/>
+          <ac:cxnSpMkLst>
+            <pc:docMk/>
+            <pc:sldMk cId="2395916845" sldId="256"/>
+            <ac:cxnSpMk id="47" creationId="{F549FB57-22E3-6624-6476-C9F5D6D59838}"/>
+          </ac:cxnSpMkLst>
+        </pc:cxnChg>
+        <pc:cxnChg chg="add del mod">
+          <ac:chgData name="Flavio Martins Da Cruz" userId="7dbe8e30-2e97-43ef-8040-520ddcc14afe" providerId="ADAL" clId="{D2BFB781-41E8-44D7-8625-CC045B935F9E}" dt="2022-10-08T02:18:44.982" v="44" actId="478"/>
+          <ac:cxnSpMkLst>
+            <pc:docMk/>
+            <pc:sldMk cId="2395916845" sldId="256"/>
+            <ac:cxnSpMk id="49" creationId="{DAE98953-2B02-80A3-8511-D6CEEE7F60B2}"/>
+          </ac:cxnSpMkLst>
+        </pc:cxnChg>
+        <pc:cxnChg chg="add mod topLvl">
+          <ac:chgData name="Flavio Martins Da Cruz" userId="7dbe8e30-2e97-43ef-8040-520ddcc14afe" providerId="ADAL" clId="{D2BFB781-41E8-44D7-8625-CC045B935F9E}" dt="2022-10-08T02:26:50.720" v="165" actId="692"/>
+          <ac:cxnSpMkLst>
+            <pc:docMk/>
+            <pc:sldMk cId="2395916845" sldId="256"/>
+            <ac:cxnSpMk id="51" creationId="{1DB3AFC0-BE1A-6D64-FCE3-5C34C42DDE20}"/>
+          </ac:cxnSpMkLst>
+        </pc:cxnChg>
+        <pc:cxnChg chg="add mod topLvl">
+          <ac:chgData name="Flavio Martins Da Cruz" userId="7dbe8e30-2e97-43ef-8040-520ddcc14afe" providerId="ADAL" clId="{D2BFB781-41E8-44D7-8625-CC045B935F9E}" dt="2022-10-08T02:26:24.967" v="164" actId="165"/>
+          <ac:cxnSpMkLst>
+            <pc:docMk/>
+            <pc:sldMk cId="2395916845" sldId="256"/>
+            <ac:cxnSpMk id="52" creationId="{92400E6F-D17D-89D2-B0EA-94EA0AD6E03D}"/>
+          </ac:cxnSpMkLst>
+        </pc:cxnChg>
+        <pc:cxnChg chg="mod topLvl">
+          <ac:chgData name="Flavio Martins Da Cruz" userId="7dbe8e30-2e97-43ef-8040-520ddcc14afe" providerId="ADAL" clId="{D2BFB781-41E8-44D7-8625-CC045B935F9E}" dt="2022-10-08T02:20:54.788" v="94" actId="14100"/>
+          <ac:cxnSpMkLst>
+            <pc:docMk/>
+            <pc:sldMk cId="2395916845" sldId="256"/>
+            <ac:cxnSpMk id="58" creationId="{93CA95B1-CAE2-9F51-F73F-4A983FE82DE5}"/>
+          </ac:cxnSpMkLst>
+        </pc:cxnChg>
+        <pc:cxnChg chg="mod topLvl">
+          <ac:chgData name="Flavio Martins Da Cruz" userId="7dbe8e30-2e97-43ef-8040-520ddcc14afe" providerId="ADAL" clId="{D2BFB781-41E8-44D7-8625-CC045B935F9E}" dt="2022-10-08T02:26:56.369" v="166" actId="692"/>
+          <ac:cxnSpMkLst>
+            <pc:docMk/>
+            <pc:sldMk cId="2395916845" sldId="256"/>
+            <ac:cxnSpMk id="59" creationId="{59160EB9-9FF4-B8CF-B566-3BBE748F524C}"/>
+          </ac:cxnSpMkLst>
+        </pc:cxnChg>
+        <pc:cxnChg chg="mod topLvl">
+          <ac:chgData name="Flavio Martins Da Cruz" userId="7dbe8e30-2e97-43ef-8040-520ddcc14afe" providerId="ADAL" clId="{D2BFB781-41E8-44D7-8625-CC045B935F9E}" dt="2022-10-08T02:20:43.462" v="92" actId="165"/>
+          <ac:cxnSpMkLst>
+            <pc:docMk/>
+            <pc:sldMk cId="2395916845" sldId="256"/>
+            <ac:cxnSpMk id="60" creationId="{92C4D408-7A7B-5089-E838-0489422B0F22}"/>
+          </ac:cxnSpMkLst>
+        </pc:cxnChg>
+        <pc:cxnChg chg="add mod">
+          <ac:chgData name="Flavio Martins Da Cruz" userId="7dbe8e30-2e97-43ef-8040-520ddcc14afe" providerId="ADAL" clId="{D2BFB781-41E8-44D7-8625-CC045B935F9E}" dt="2022-10-08T02:27:06.541" v="168" actId="692"/>
+          <ac:cxnSpMkLst>
+            <pc:docMk/>
+            <pc:sldMk cId="2395916845" sldId="256"/>
+            <ac:cxnSpMk id="63" creationId="{0BD8365D-CF5E-42C7-A81D-4A0181080EA8}"/>
+          </ac:cxnSpMkLst>
+        </pc:cxnChg>
+        <pc:cxnChg chg="mod topLvl">
+          <ac:chgData name="Flavio Martins Da Cruz" userId="7dbe8e30-2e97-43ef-8040-520ddcc14afe" providerId="ADAL" clId="{D2BFB781-41E8-44D7-8625-CC045B935F9E}" dt="2022-10-08T02:23:52.907" v="133" actId="165"/>
+          <ac:cxnSpMkLst>
+            <pc:docMk/>
+            <pc:sldMk cId="2395916845" sldId="256"/>
+            <ac:cxnSpMk id="65" creationId="{30073670-C4D0-B8BE-179E-D8332EC070E8}"/>
+          </ac:cxnSpMkLst>
+        </pc:cxnChg>
+        <pc:cxnChg chg="mod topLvl">
+          <ac:chgData name="Flavio Martins Da Cruz" userId="7dbe8e30-2e97-43ef-8040-520ddcc14afe" providerId="ADAL" clId="{D2BFB781-41E8-44D7-8625-CC045B935F9E}" dt="2022-10-08T02:27:15.572" v="170" actId="692"/>
+          <ac:cxnSpMkLst>
+            <pc:docMk/>
+            <pc:sldMk cId="2395916845" sldId="256"/>
+            <ac:cxnSpMk id="66" creationId="{CA100E5C-E8FE-DDEB-5AB9-5538FCD7B866}"/>
+          </ac:cxnSpMkLst>
+        </pc:cxnChg>
+        <pc:cxnChg chg="mod topLvl">
+          <ac:chgData name="Flavio Martins Da Cruz" userId="7dbe8e30-2e97-43ef-8040-520ddcc14afe" providerId="ADAL" clId="{D2BFB781-41E8-44D7-8625-CC045B935F9E}" dt="2022-10-08T02:23:52.907" v="133" actId="165"/>
+          <ac:cxnSpMkLst>
+            <pc:docMk/>
+            <pc:sldMk cId="2395916845" sldId="256"/>
+            <ac:cxnSpMk id="67" creationId="{7566C93B-ABB7-3DA5-43E5-3114B2A2C01F}"/>
+          </ac:cxnSpMkLst>
+        </pc:cxnChg>
+        <pc:cxnChg chg="add mod">
+          <ac:chgData name="Flavio Martins Da Cruz" userId="7dbe8e30-2e97-43ef-8040-520ddcc14afe" providerId="ADAL" clId="{D2BFB781-41E8-44D7-8625-CC045B935F9E}" dt="2022-10-08T02:23:26.436" v="121" actId="1076"/>
+          <ac:cxnSpMkLst>
+            <pc:docMk/>
+            <pc:sldMk cId="2395916845" sldId="256"/>
+            <ac:cxnSpMk id="68" creationId="{A4A56361-DC8B-B2ED-124F-041B4554F4BF}"/>
+          </ac:cxnSpMkLst>
+        </pc:cxnChg>
+        <pc:cxnChg chg="add mod">
+          <ac:chgData name="Flavio Martins Da Cruz" userId="7dbe8e30-2e97-43ef-8040-520ddcc14afe" providerId="ADAL" clId="{D2BFB781-41E8-44D7-8625-CC045B935F9E}" dt="2022-10-08T02:27:12.209" v="169" actId="692"/>
+          <ac:cxnSpMkLst>
+            <pc:docMk/>
+            <pc:sldMk cId="2395916845" sldId="256"/>
+            <ac:cxnSpMk id="69" creationId="{1CCDECBF-8D94-F936-E449-1E73CEA6EC33}"/>
+          </ac:cxnSpMkLst>
+        </pc:cxnChg>
+        <pc:cxnChg chg="add mod">
+          <ac:chgData name="Flavio Martins Da Cruz" userId="7dbe8e30-2e97-43ef-8040-520ddcc14afe" providerId="ADAL" clId="{D2BFB781-41E8-44D7-8625-CC045B935F9E}" dt="2022-10-08T02:23:31.956" v="126" actId="1035"/>
+          <ac:cxnSpMkLst>
+            <pc:docMk/>
+            <pc:sldMk cId="2395916845" sldId="256"/>
+            <ac:cxnSpMk id="70" creationId="{588D99B9-3E74-3AED-1ACA-EFF779BC7F2C}"/>
+          </ac:cxnSpMkLst>
+        </pc:cxnChg>
+        <pc:cxnChg chg="add mod">
+          <ac:chgData name="Flavio Martins Da Cruz" userId="7dbe8e30-2e97-43ef-8040-520ddcc14afe" providerId="ADAL" clId="{D2BFB781-41E8-44D7-8625-CC045B935F9E}" dt="2022-10-08T02:26:11.294" v="163" actId="108"/>
+          <ac:cxnSpMkLst>
+            <pc:docMk/>
+            <pc:sldMk cId="2395916845" sldId="256"/>
+            <ac:cxnSpMk id="73" creationId="{0FCCB4F4-DB0A-9321-A747-49166180622A}"/>
+          </ac:cxnSpMkLst>
+        </pc:cxnChg>
+        <pc:cxnChg chg="add mod">
+          <ac:chgData name="Flavio Martins Da Cruz" userId="7dbe8e30-2e97-43ef-8040-520ddcc14afe" providerId="ADAL" clId="{D2BFB781-41E8-44D7-8625-CC045B935F9E}" dt="2022-10-08T02:26:09.885" v="162" actId="108"/>
+          <ac:cxnSpMkLst>
+            <pc:docMk/>
+            <pc:sldMk cId="2395916845" sldId="256"/>
+            <ac:cxnSpMk id="76" creationId="{96E538A7-8A5B-93CE-5488-F6F65C033C65}"/>
+          </ac:cxnSpMkLst>
+        </pc:cxnChg>
+        <pc:cxnChg chg="add mod">
+          <ac:chgData name="Flavio Martins Da Cruz" userId="7dbe8e30-2e97-43ef-8040-520ddcc14afe" providerId="ADAL" clId="{D2BFB781-41E8-44D7-8625-CC045B935F9E}" dt="2022-10-08T02:26:08.106" v="161" actId="108"/>
+          <ac:cxnSpMkLst>
+            <pc:docMk/>
+            <pc:sldMk cId="2395916845" sldId="256"/>
+            <ac:cxnSpMk id="79" creationId="{D272DB7B-A536-8EF7-4FD2-41715E02F7A9}"/>
+          </ac:cxnSpMkLst>
+        </pc:cxnChg>
+      </pc:sldChg>
+    </pc:docChg>
+  </pc:docChgLst>
+</pc:chgInfo>
 </file>
 
 <file path=ppt/slideLayouts/slideLayout1.xml><?xml version="1.0" encoding="utf-8"?>
@@ -239,7 +545,7 @@
           <a:p>
             <a:fld id="{0DA3BD58-FCCD-47AE-8964-E1D78058AAED}" type="datetimeFigureOut">
               <a:rPr lang="pt-BR" smtClean="0"/>
-              <a:t>02/10/2022</a:t>
+              <a:t>07/10/2022</a:t>
             </a:fld>
             <a:endParaRPr lang="pt-BR"/>
           </a:p>
@@ -409,7 +715,7 @@
           <a:p>
             <a:fld id="{0DA3BD58-FCCD-47AE-8964-E1D78058AAED}" type="datetimeFigureOut">
               <a:rPr lang="pt-BR" smtClean="0"/>
-              <a:t>02/10/2022</a:t>
+              <a:t>07/10/2022</a:t>
             </a:fld>
             <a:endParaRPr lang="pt-BR"/>
           </a:p>
@@ -589,7 +895,7 @@
           <a:p>
             <a:fld id="{0DA3BD58-FCCD-47AE-8964-E1D78058AAED}" type="datetimeFigureOut">
               <a:rPr lang="pt-BR" smtClean="0"/>
-              <a:t>02/10/2022</a:t>
+              <a:t>07/10/2022</a:t>
             </a:fld>
             <a:endParaRPr lang="pt-BR"/>
           </a:p>
@@ -759,7 +1065,7 @@
           <a:p>
             <a:fld id="{0DA3BD58-FCCD-47AE-8964-E1D78058AAED}" type="datetimeFigureOut">
               <a:rPr lang="pt-BR" smtClean="0"/>
-              <a:t>02/10/2022</a:t>
+              <a:t>07/10/2022</a:t>
             </a:fld>
             <a:endParaRPr lang="pt-BR"/>
           </a:p>
@@ -1003,7 +1309,7 @@
           <a:p>
             <a:fld id="{0DA3BD58-FCCD-47AE-8964-E1D78058AAED}" type="datetimeFigureOut">
               <a:rPr lang="pt-BR" smtClean="0"/>
-              <a:t>02/10/2022</a:t>
+              <a:t>07/10/2022</a:t>
             </a:fld>
             <a:endParaRPr lang="pt-BR"/>
           </a:p>
@@ -1235,7 +1541,7 @@
           <a:p>
             <a:fld id="{0DA3BD58-FCCD-47AE-8964-E1D78058AAED}" type="datetimeFigureOut">
               <a:rPr lang="pt-BR" smtClean="0"/>
-              <a:t>02/10/2022</a:t>
+              <a:t>07/10/2022</a:t>
             </a:fld>
             <a:endParaRPr lang="pt-BR"/>
           </a:p>
@@ -1602,7 +1908,7 @@
           <a:p>
             <a:fld id="{0DA3BD58-FCCD-47AE-8964-E1D78058AAED}" type="datetimeFigureOut">
               <a:rPr lang="pt-BR" smtClean="0"/>
-              <a:t>02/10/2022</a:t>
+              <a:t>07/10/2022</a:t>
             </a:fld>
             <a:endParaRPr lang="pt-BR"/>
           </a:p>
@@ -1720,7 +2026,7 @@
           <a:p>
             <a:fld id="{0DA3BD58-FCCD-47AE-8964-E1D78058AAED}" type="datetimeFigureOut">
               <a:rPr lang="pt-BR" smtClean="0"/>
-              <a:t>02/10/2022</a:t>
+              <a:t>07/10/2022</a:t>
             </a:fld>
             <a:endParaRPr lang="pt-BR"/>
           </a:p>
@@ -1815,7 +2121,7 @@
           <a:p>
             <a:fld id="{0DA3BD58-FCCD-47AE-8964-E1D78058AAED}" type="datetimeFigureOut">
               <a:rPr lang="pt-BR" smtClean="0"/>
-              <a:t>02/10/2022</a:t>
+              <a:t>07/10/2022</a:t>
             </a:fld>
             <a:endParaRPr lang="pt-BR"/>
           </a:p>
@@ -2092,7 +2398,7 @@
           <a:p>
             <a:fld id="{0DA3BD58-FCCD-47AE-8964-E1D78058AAED}" type="datetimeFigureOut">
               <a:rPr lang="pt-BR" smtClean="0"/>
-              <a:t>02/10/2022</a:t>
+              <a:t>07/10/2022</a:t>
             </a:fld>
             <a:endParaRPr lang="pt-BR"/>
           </a:p>
@@ -2349,7 +2655,7 @@
           <a:p>
             <a:fld id="{0DA3BD58-FCCD-47AE-8964-E1D78058AAED}" type="datetimeFigureOut">
               <a:rPr lang="pt-BR" smtClean="0"/>
-              <a:t>02/10/2022</a:t>
+              <a:t>07/10/2022</a:t>
             </a:fld>
             <a:endParaRPr lang="pt-BR"/>
           </a:p>
@@ -2562,7 +2868,7 @@
           <a:p>
             <a:fld id="{0DA3BD58-FCCD-47AE-8964-E1D78058AAED}" type="datetimeFigureOut">
               <a:rPr lang="pt-BR" smtClean="0"/>
-              <a:t>02/10/2022</a:t>
+              <a:t>07/10/2022</a:t>
             </a:fld>
             <a:endParaRPr lang="pt-BR"/>
           </a:p>
@@ -3174,7 +3480,7 @@
         </p:blipFill>
         <p:spPr>
           <a:xfrm>
-            <a:off x="4312882" y="6588796"/>
+            <a:off x="4312882" y="5662912"/>
             <a:ext cx="2310130" cy="1819310"/>
           </a:xfrm>
           <a:prstGeom prst="rect">
@@ -3351,8 +3657,8 @@
         </p:nvSpPr>
         <p:spPr>
           <a:xfrm>
-            <a:off x="7510134" y="5995984"/>
-            <a:ext cx="2393796" cy="369332"/>
+            <a:off x="7498275" y="5995984"/>
+            <a:ext cx="2417521" cy="369332"/>
           </a:xfrm>
           <a:prstGeom prst="rect">
             <a:avLst/>
@@ -3368,7 +3674,7 @@
             <a:pPr algn="ctr"/>
             <a:r>
               <a:rPr lang="pt-BR" dirty="0"/>
-              <a:t>Exemplo de informação</a:t>
+              <a:t>Informação selecionada</a:t>
             </a:r>
           </a:p>
         </p:txBody>
@@ -3387,7 +3693,7 @@
         </p:nvSpPr>
         <p:spPr>
           <a:xfrm>
-            <a:off x="4792016" y="6219464"/>
+            <a:off x="4792016" y="5293580"/>
             <a:ext cx="1422184" cy="369332"/>
           </a:xfrm>
           <a:prstGeom prst="rect">
@@ -3435,7 +3741,8 @@
                 <a:lumMod val="25000"/>
               </a:schemeClr>
             </a:solidFill>
-            <a:tailEnd type="triangle"/>
+            <a:headEnd type="oval" w="med" len="med"/>
+            <a:tailEnd type="triangle" w="med" len="med"/>
           </a:ln>
         </p:spPr>
         <p:style>
@@ -3481,7 +3788,8 @@
                 <a:lumMod val="25000"/>
               </a:schemeClr>
             </a:solidFill>
-            <a:tailEnd type="triangle"/>
+            <a:headEnd type="oval" w="med" len="med"/>
+            <a:tailEnd type="triangle" w="med" len="med"/>
           </a:ln>
         </p:spPr>
         <p:style>
@@ -3527,7 +3835,8 @@
                 <a:lumMod val="25000"/>
               </a:schemeClr>
             </a:solidFill>
-            <a:tailEnd type="triangle"/>
+            <a:headEnd type="oval" w="med" len="med"/>
+            <a:tailEnd type="triangle" w="med" len="med"/>
           </a:ln>
         </p:spPr>
         <p:style>
@@ -3573,7 +3882,8 @@
                 <a:lumMod val="25000"/>
               </a:schemeClr>
             </a:solidFill>
-            <a:tailEnd type="triangle"/>
+            <a:headEnd type="oval" w="med" len="med"/>
+            <a:tailEnd type="triangle" w="med" len="med"/>
           </a:ln>
         </p:spPr>
         <p:style>
@@ -3591,48 +3901,6 @@
           </a:fontRef>
         </p:style>
       </p:cxnSp>
-      <p:sp>
-        <p:nvSpPr>
-          <p:cNvPr id="39" name="CaixaDeTexto 38">
-            <a:extLst>
-              <a:ext uri="{FF2B5EF4-FFF2-40B4-BE49-F238E27FC236}">
-                <a16:creationId xmlns:a16="http://schemas.microsoft.com/office/drawing/2014/main" id="{AB8C9557-D509-9AFA-A263-3D8B241DB654}"/>
-              </a:ext>
-            </a:extLst>
-          </p:cNvPr>
-          <p:cNvSpPr txBox="1"/>
-          <p:nvPr/>
-        </p:nvSpPr>
-        <p:spPr>
-          <a:xfrm>
-            <a:off x="4597732" y="5260040"/>
-            <a:ext cx="1743106" cy="369332"/>
-          </a:xfrm>
-          <a:prstGeom prst="rect">
-            <a:avLst/>
-          </a:prstGeom>
-          <a:noFill/>
-          <a:ln>
-            <a:solidFill>
-              <a:schemeClr val="tx1"/>
-            </a:solidFill>
-            <a:prstDash val="dash"/>
-          </a:ln>
-        </p:spPr>
-        <p:txBody>
-          <a:bodyPr wrap="none" rtlCol="0">
-            <a:spAutoFit/>
-          </a:bodyPr>
-          <a:lstStyle/>
-          <a:p>
-            <a:pPr algn="ctr"/>
-            <a:r>
-              <a:rPr lang="pt-BR" dirty="0"/>
-              <a:t>Todas as páginas</a:t>
-            </a:r>
-          </a:p>
-        </p:txBody>
-      </p:sp>
       <p:cxnSp>
         <p:nvCxnSpPr>
           <p:cNvPr id="41" name="Conector de Seta Reta 40">
@@ -3649,8 +3917,8 @@
         </p:nvCxnSpPr>
         <p:spPr>
           <a:xfrm>
-            <a:off x="5467706" y="5623682"/>
-            <a:ext cx="0" cy="556968"/>
+            <a:off x="5247640" y="4398618"/>
+            <a:ext cx="0" cy="864607"/>
           </a:xfrm>
           <a:prstGeom prst="straightConnector1">
             <a:avLst/>
@@ -3661,53 +3929,8 @@
                 <a:lumMod val="25000"/>
               </a:schemeClr>
             </a:solidFill>
-            <a:tailEnd type="triangle"/>
-          </a:ln>
-        </p:spPr>
-        <p:style>
-          <a:lnRef idx="1">
-            <a:schemeClr val="accent1"/>
-          </a:lnRef>
-          <a:fillRef idx="0">
-            <a:schemeClr val="accent1"/>
-          </a:fillRef>
-          <a:effectRef idx="0">
-            <a:schemeClr val="accent1"/>
-          </a:effectRef>
-          <a:fontRef idx="minor">
-            <a:schemeClr val="tx1"/>
-          </a:fontRef>
-        </p:style>
-      </p:cxnSp>
-      <p:cxnSp>
-        <p:nvCxnSpPr>
-          <p:cNvPr id="42" name="Conector de Seta Reta 41">
-            <a:extLst>
-              <a:ext uri="{FF2B5EF4-FFF2-40B4-BE49-F238E27FC236}">
-                <a16:creationId xmlns:a16="http://schemas.microsoft.com/office/drawing/2014/main" id="{ACE855D9-3F22-5ABB-86D8-6503342BA30F}"/>
-              </a:ext>
-            </a:extLst>
-          </p:cNvPr>
-          <p:cNvCxnSpPr>
-            <a:cxnSpLocks/>
-          </p:cNvCxnSpPr>
-          <p:nvPr/>
-        </p:nvCxnSpPr>
-        <p:spPr>
-          <a:xfrm flipV="1">
-            <a:off x="5467707" y="4398618"/>
-            <a:ext cx="8425" cy="838544"/>
-          </a:xfrm>
-          <a:prstGeom prst="straightConnector1">
-            <a:avLst/>
-          </a:prstGeom>
-          <a:ln w="38100">
-            <a:solidFill>
-              <a:schemeClr val="bg2">
-                <a:lumMod val="25000"/>
-              </a:schemeClr>
-            </a:solidFill>
-            <a:tailEnd type="triangle"/>
+            <a:headEnd type="oval" w="med" len="med"/>
+            <a:tailEnd type="triangle" w="med" len="med"/>
           </a:ln>
         </p:spPr>
         <p:style>
@@ -3747,7 +3970,7 @@
           <a:prstGeom prst="bentConnector4">
             <a:avLst>
               <a:gd name="adj1" fmla="val 504"/>
-              <a:gd name="adj2" fmla="val 266981"/>
+              <a:gd name="adj2" fmla="val 464018"/>
             </a:avLst>
           </a:prstGeom>
           <a:ln w="38100">
@@ -3756,7 +3979,759 @@
                 <a:lumMod val="25000"/>
               </a:schemeClr>
             </a:solidFill>
+            <a:headEnd type="oval"/>
             <a:tailEnd type="triangle"/>
+          </a:ln>
+        </p:spPr>
+        <p:style>
+          <a:lnRef idx="1">
+            <a:schemeClr val="accent1"/>
+          </a:lnRef>
+          <a:fillRef idx="0">
+            <a:schemeClr val="accent1"/>
+          </a:fillRef>
+          <a:effectRef idx="0">
+            <a:schemeClr val="accent1"/>
+          </a:effectRef>
+          <a:fontRef idx="minor">
+            <a:schemeClr val="tx1"/>
+          </a:fontRef>
+        </p:style>
+      </p:cxnSp>
+      <p:cxnSp>
+        <p:nvCxnSpPr>
+          <p:cNvPr id="47" name="Conector de Seta Reta 46">
+            <a:extLst>
+              <a:ext uri="{FF2B5EF4-FFF2-40B4-BE49-F238E27FC236}">
+                <a16:creationId xmlns:a16="http://schemas.microsoft.com/office/drawing/2014/main" id="{F549FB57-22E3-6624-6476-C9F5D6D59838}"/>
+              </a:ext>
+            </a:extLst>
+          </p:cNvPr>
+          <p:cNvCxnSpPr>
+            <a:cxnSpLocks/>
+          </p:cNvCxnSpPr>
+          <p:nvPr/>
+        </p:nvCxnSpPr>
+        <p:spPr>
+          <a:xfrm>
+            <a:off x="7429500" y="6572567"/>
+            <a:ext cx="246089" cy="0"/>
+          </a:xfrm>
+          <a:prstGeom prst="straightConnector1">
+            <a:avLst/>
+          </a:prstGeom>
+          <a:ln w="38100">
+            <a:solidFill>
+              <a:schemeClr val="bg2">
+                <a:lumMod val="25000"/>
+              </a:schemeClr>
+            </a:solidFill>
+            <a:tailEnd type="triangle"/>
+          </a:ln>
+        </p:spPr>
+        <p:style>
+          <a:lnRef idx="1">
+            <a:schemeClr val="accent1"/>
+          </a:lnRef>
+          <a:fillRef idx="0">
+            <a:schemeClr val="accent1"/>
+          </a:fillRef>
+          <a:effectRef idx="0">
+            <a:schemeClr val="accent1"/>
+          </a:effectRef>
+          <a:fontRef idx="minor">
+            <a:schemeClr val="tx1"/>
+          </a:fontRef>
+        </p:style>
+      </p:cxnSp>
+      <p:cxnSp>
+        <p:nvCxnSpPr>
+          <p:cNvPr id="51" name="Conector reto 50">
+            <a:extLst>
+              <a:ext uri="{FF2B5EF4-FFF2-40B4-BE49-F238E27FC236}">
+                <a16:creationId xmlns:a16="http://schemas.microsoft.com/office/drawing/2014/main" id="{1DB3AFC0-BE1A-6D64-FCE3-5C34C42DDE20}"/>
+              </a:ext>
+            </a:extLst>
+          </p:cNvPr>
+          <p:cNvCxnSpPr>
+            <a:cxnSpLocks/>
+          </p:cNvCxnSpPr>
+          <p:nvPr/>
+        </p:nvCxnSpPr>
+        <p:spPr>
+          <a:xfrm flipH="1">
+            <a:off x="7426960" y="4888550"/>
+            <a:ext cx="428627" cy="0"/>
+          </a:xfrm>
+          <a:prstGeom prst="line">
+            <a:avLst/>
+          </a:prstGeom>
+          <a:ln w="38100">
+            <a:solidFill>
+              <a:schemeClr val="bg2">
+                <a:lumMod val="25000"/>
+              </a:schemeClr>
+            </a:solidFill>
+            <a:headEnd type="oval" w="med" len="med"/>
+            <a:tailEnd type="none" w="med" len="med"/>
+          </a:ln>
+        </p:spPr>
+        <p:style>
+          <a:lnRef idx="1">
+            <a:schemeClr val="accent1"/>
+          </a:lnRef>
+          <a:fillRef idx="0">
+            <a:schemeClr val="accent1"/>
+          </a:fillRef>
+          <a:effectRef idx="0">
+            <a:schemeClr val="accent1"/>
+          </a:effectRef>
+          <a:fontRef idx="minor">
+            <a:schemeClr val="tx1"/>
+          </a:fontRef>
+        </p:style>
+      </p:cxnSp>
+      <p:cxnSp>
+        <p:nvCxnSpPr>
+          <p:cNvPr id="52" name="Conector reto 51">
+            <a:extLst>
+              <a:ext uri="{FF2B5EF4-FFF2-40B4-BE49-F238E27FC236}">
+                <a16:creationId xmlns:a16="http://schemas.microsoft.com/office/drawing/2014/main" id="{92400E6F-D17D-89D2-B0EA-94EA0AD6E03D}"/>
+              </a:ext>
+            </a:extLst>
+          </p:cNvPr>
+          <p:cNvCxnSpPr>
+            <a:cxnSpLocks/>
+          </p:cNvCxnSpPr>
+          <p:nvPr/>
+        </p:nvCxnSpPr>
+        <p:spPr>
+          <a:xfrm flipV="1">
+            <a:off x="7445180" y="4891090"/>
+            <a:ext cx="0" cy="1691637"/>
+          </a:xfrm>
+          <a:prstGeom prst="line">
+            <a:avLst/>
+          </a:prstGeom>
+          <a:ln w="38100">
+            <a:solidFill>
+              <a:schemeClr val="bg2">
+                <a:lumMod val="25000"/>
+              </a:schemeClr>
+            </a:solidFill>
+            <a:headEnd type="none" w="med" len="med"/>
+            <a:tailEnd type="none" w="med" len="med"/>
+          </a:ln>
+        </p:spPr>
+        <p:style>
+          <a:lnRef idx="1">
+            <a:schemeClr val="accent1"/>
+          </a:lnRef>
+          <a:fillRef idx="0">
+            <a:schemeClr val="accent1"/>
+          </a:fillRef>
+          <a:effectRef idx="0">
+            <a:schemeClr val="accent1"/>
+          </a:effectRef>
+          <a:fontRef idx="minor">
+            <a:schemeClr val="tx1"/>
+          </a:fontRef>
+        </p:style>
+      </p:cxnSp>
+      <p:cxnSp>
+        <p:nvCxnSpPr>
+          <p:cNvPr id="58" name="Conector de Seta Reta 57">
+            <a:extLst>
+              <a:ext uri="{FF2B5EF4-FFF2-40B4-BE49-F238E27FC236}">
+                <a16:creationId xmlns:a16="http://schemas.microsoft.com/office/drawing/2014/main" id="{93CA95B1-CAE2-9F51-F73F-4A983FE82DE5}"/>
+              </a:ext>
+            </a:extLst>
+          </p:cNvPr>
+          <p:cNvCxnSpPr>
+            <a:cxnSpLocks/>
+          </p:cNvCxnSpPr>
+          <p:nvPr/>
+        </p:nvCxnSpPr>
+        <p:spPr>
+          <a:xfrm>
+            <a:off x="7236634" y="7062251"/>
+            <a:ext cx="415810" cy="0"/>
+          </a:xfrm>
+          <a:prstGeom prst="straightConnector1">
+            <a:avLst/>
+          </a:prstGeom>
+          <a:ln w="38100">
+            <a:solidFill>
+              <a:schemeClr val="bg2">
+                <a:lumMod val="25000"/>
+              </a:schemeClr>
+            </a:solidFill>
+            <a:tailEnd type="triangle"/>
+          </a:ln>
+        </p:spPr>
+        <p:style>
+          <a:lnRef idx="1">
+            <a:schemeClr val="accent1"/>
+          </a:lnRef>
+          <a:fillRef idx="0">
+            <a:schemeClr val="accent1"/>
+          </a:fillRef>
+          <a:effectRef idx="0">
+            <a:schemeClr val="accent1"/>
+          </a:effectRef>
+          <a:fontRef idx="minor">
+            <a:schemeClr val="tx1"/>
+          </a:fontRef>
+        </p:style>
+      </p:cxnSp>
+      <p:cxnSp>
+        <p:nvCxnSpPr>
+          <p:cNvPr id="59" name="Conector reto 58">
+            <a:extLst>
+              <a:ext uri="{FF2B5EF4-FFF2-40B4-BE49-F238E27FC236}">
+                <a16:creationId xmlns:a16="http://schemas.microsoft.com/office/drawing/2014/main" id="{59160EB9-9FF4-B8CF-B566-3BBE748F524C}"/>
+              </a:ext>
+            </a:extLst>
+          </p:cNvPr>
+          <p:cNvCxnSpPr>
+            <a:cxnSpLocks/>
+          </p:cNvCxnSpPr>
+          <p:nvPr/>
+        </p:nvCxnSpPr>
+        <p:spPr>
+          <a:xfrm flipH="1">
+            <a:off x="7225204" y="4290155"/>
+            <a:ext cx="618953" cy="0"/>
+          </a:xfrm>
+          <a:prstGeom prst="line">
+            <a:avLst/>
+          </a:prstGeom>
+          <a:ln w="38100">
+            <a:solidFill>
+              <a:schemeClr val="bg2">
+                <a:lumMod val="25000"/>
+              </a:schemeClr>
+            </a:solidFill>
+            <a:headEnd type="oval" w="med" len="med"/>
+            <a:tailEnd type="none" w="med" len="med"/>
+          </a:ln>
+        </p:spPr>
+        <p:style>
+          <a:lnRef idx="1">
+            <a:schemeClr val="accent1"/>
+          </a:lnRef>
+          <a:fillRef idx="0">
+            <a:schemeClr val="accent1"/>
+          </a:fillRef>
+          <a:effectRef idx="0">
+            <a:schemeClr val="accent1"/>
+          </a:effectRef>
+          <a:fontRef idx="minor">
+            <a:schemeClr val="tx1"/>
+          </a:fontRef>
+        </p:style>
+      </p:cxnSp>
+      <p:cxnSp>
+        <p:nvCxnSpPr>
+          <p:cNvPr id="60" name="Conector reto 59">
+            <a:extLst>
+              <a:ext uri="{FF2B5EF4-FFF2-40B4-BE49-F238E27FC236}">
+                <a16:creationId xmlns:a16="http://schemas.microsoft.com/office/drawing/2014/main" id="{92C4D408-7A7B-5089-E838-0489422B0F22}"/>
+              </a:ext>
+            </a:extLst>
+          </p:cNvPr>
+          <p:cNvCxnSpPr>
+            <a:cxnSpLocks/>
+          </p:cNvCxnSpPr>
+          <p:nvPr/>
+        </p:nvCxnSpPr>
+        <p:spPr>
+          <a:xfrm flipV="1">
+            <a:off x="7236634" y="4294336"/>
+            <a:ext cx="0" cy="2784640"/>
+          </a:xfrm>
+          <a:prstGeom prst="line">
+            <a:avLst/>
+          </a:prstGeom>
+          <a:ln w="38100">
+            <a:solidFill>
+              <a:schemeClr val="bg2">
+                <a:lumMod val="25000"/>
+              </a:schemeClr>
+            </a:solidFill>
+            <a:headEnd type="none" w="med" len="med"/>
+            <a:tailEnd type="none" w="med" len="med"/>
+          </a:ln>
+        </p:spPr>
+        <p:style>
+          <a:lnRef idx="1">
+            <a:schemeClr val="accent1"/>
+          </a:lnRef>
+          <a:fillRef idx="0">
+            <a:schemeClr val="accent1"/>
+          </a:fillRef>
+          <a:effectRef idx="0">
+            <a:schemeClr val="accent1"/>
+          </a:effectRef>
+          <a:fontRef idx="minor">
+            <a:schemeClr val="tx1"/>
+          </a:fontRef>
+        </p:style>
+      </p:cxnSp>
+      <p:cxnSp>
+        <p:nvCxnSpPr>
+          <p:cNvPr id="63" name="Conector: Angulado 62">
+            <a:extLst>
+              <a:ext uri="{FF2B5EF4-FFF2-40B4-BE49-F238E27FC236}">
+                <a16:creationId xmlns:a16="http://schemas.microsoft.com/office/drawing/2014/main" id="{0BD8365D-CF5E-42C7-A81D-4A0181080EA8}"/>
+              </a:ext>
+            </a:extLst>
+          </p:cNvPr>
+          <p:cNvCxnSpPr>
+            <a:cxnSpLocks/>
+          </p:cNvCxnSpPr>
+          <p:nvPr/>
+        </p:nvCxnSpPr>
+        <p:spPr>
+          <a:xfrm rot="16200000" flipH="1">
+            <a:off x="7819000" y="5579854"/>
+            <a:ext cx="3672095" cy="182536"/>
+          </a:xfrm>
+          <a:prstGeom prst="bentConnector4">
+            <a:avLst>
+              <a:gd name="adj1" fmla="val 504"/>
+              <a:gd name="adj2" fmla="val 464018"/>
+            </a:avLst>
+          </a:prstGeom>
+          <a:ln w="38100">
+            <a:solidFill>
+              <a:schemeClr val="bg2">
+                <a:lumMod val="25000"/>
+              </a:schemeClr>
+            </a:solidFill>
+            <a:headEnd type="oval"/>
+            <a:tailEnd type="triangle"/>
+          </a:ln>
+        </p:spPr>
+        <p:style>
+          <a:lnRef idx="1">
+            <a:schemeClr val="accent1"/>
+          </a:lnRef>
+          <a:fillRef idx="0">
+            <a:schemeClr val="accent1"/>
+          </a:fillRef>
+          <a:effectRef idx="0">
+            <a:schemeClr val="accent1"/>
+          </a:effectRef>
+          <a:fontRef idx="minor">
+            <a:schemeClr val="tx1"/>
+          </a:fontRef>
+        </p:style>
+      </p:cxnSp>
+      <p:cxnSp>
+        <p:nvCxnSpPr>
+          <p:cNvPr id="65" name="Conector de Seta Reta 64">
+            <a:extLst>
+              <a:ext uri="{FF2B5EF4-FFF2-40B4-BE49-F238E27FC236}">
+                <a16:creationId xmlns:a16="http://schemas.microsoft.com/office/drawing/2014/main" id="{30073670-C4D0-B8BE-179E-D8332EC070E8}"/>
+              </a:ext>
+            </a:extLst>
+          </p:cNvPr>
+          <p:cNvCxnSpPr>
+            <a:cxnSpLocks/>
+          </p:cNvCxnSpPr>
+          <p:nvPr/>
+        </p:nvCxnSpPr>
+        <p:spPr>
+          <a:xfrm flipH="1">
+            <a:off x="9755208" y="6613605"/>
+            <a:ext cx="246089" cy="0"/>
+          </a:xfrm>
+          <a:prstGeom prst="straightConnector1">
+            <a:avLst/>
+          </a:prstGeom>
+          <a:ln w="38100">
+            <a:solidFill>
+              <a:schemeClr val="bg2">
+                <a:lumMod val="25000"/>
+              </a:schemeClr>
+            </a:solidFill>
+            <a:tailEnd type="triangle"/>
+          </a:ln>
+        </p:spPr>
+        <p:style>
+          <a:lnRef idx="1">
+            <a:schemeClr val="accent1"/>
+          </a:lnRef>
+          <a:fillRef idx="0">
+            <a:schemeClr val="accent1"/>
+          </a:fillRef>
+          <a:effectRef idx="0">
+            <a:schemeClr val="accent1"/>
+          </a:effectRef>
+          <a:fontRef idx="minor">
+            <a:schemeClr val="tx1"/>
+          </a:fontRef>
+        </p:style>
+      </p:cxnSp>
+      <p:cxnSp>
+        <p:nvCxnSpPr>
+          <p:cNvPr id="66" name="Conector reto 65">
+            <a:extLst>
+              <a:ext uri="{FF2B5EF4-FFF2-40B4-BE49-F238E27FC236}">
+                <a16:creationId xmlns:a16="http://schemas.microsoft.com/office/drawing/2014/main" id="{CA100E5C-E8FE-DDEB-5AB9-5538FCD7B866}"/>
+              </a:ext>
+            </a:extLst>
+          </p:cNvPr>
+          <p:cNvCxnSpPr>
+            <a:cxnSpLocks/>
+          </p:cNvCxnSpPr>
+          <p:nvPr/>
+        </p:nvCxnSpPr>
+        <p:spPr>
+          <a:xfrm>
+            <a:off x="9494520" y="4929588"/>
+            <a:ext cx="501697" cy="0"/>
+          </a:xfrm>
+          <a:prstGeom prst="line">
+            <a:avLst/>
+          </a:prstGeom>
+          <a:ln w="38100">
+            <a:solidFill>
+              <a:schemeClr val="bg2">
+                <a:lumMod val="25000"/>
+              </a:schemeClr>
+            </a:solidFill>
+            <a:headEnd type="oval" w="med" len="med"/>
+            <a:tailEnd type="none" w="med" len="med"/>
+          </a:ln>
+        </p:spPr>
+        <p:style>
+          <a:lnRef idx="1">
+            <a:schemeClr val="accent1"/>
+          </a:lnRef>
+          <a:fillRef idx="0">
+            <a:schemeClr val="accent1"/>
+          </a:fillRef>
+          <a:effectRef idx="0">
+            <a:schemeClr val="accent1"/>
+          </a:effectRef>
+          <a:fontRef idx="minor">
+            <a:schemeClr val="tx1"/>
+          </a:fontRef>
+        </p:style>
+      </p:cxnSp>
+      <p:cxnSp>
+        <p:nvCxnSpPr>
+          <p:cNvPr id="67" name="Conector reto 66">
+            <a:extLst>
+              <a:ext uri="{FF2B5EF4-FFF2-40B4-BE49-F238E27FC236}">
+                <a16:creationId xmlns:a16="http://schemas.microsoft.com/office/drawing/2014/main" id="{7566C93B-ABB7-3DA5-43E5-3114B2A2C01F}"/>
+              </a:ext>
+            </a:extLst>
+          </p:cNvPr>
+          <p:cNvCxnSpPr>
+            <a:cxnSpLocks/>
+          </p:cNvCxnSpPr>
+          <p:nvPr/>
+        </p:nvCxnSpPr>
+        <p:spPr>
+          <a:xfrm flipH="1" flipV="1">
+            <a:off x="9985617" y="4932128"/>
+            <a:ext cx="0" cy="1691637"/>
+          </a:xfrm>
+          <a:prstGeom prst="line">
+            <a:avLst/>
+          </a:prstGeom>
+          <a:ln w="38100">
+            <a:solidFill>
+              <a:schemeClr val="bg2">
+                <a:lumMod val="25000"/>
+              </a:schemeClr>
+            </a:solidFill>
+            <a:headEnd type="none" w="med" len="med"/>
+            <a:tailEnd type="none" w="med" len="med"/>
+          </a:ln>
+        </p:spPr>
+        <p:style>
+          <a:lnRef idx="1">
+            <a:schemeClr val="accent1"/>
+          </a:lnRef>
+          <a:fillRef idx="0">
+            <a:schemeClr val="accent1"/>
+          </a:fillRef>
+          <a:effectRef idx="0">
+            <a:schemeClr val="accent1"/>
+          </a:effectRef>
+          <a:fontRef idx="minor">
+            <a:schemeClr val="tx1"/>
+          </a:fontRef>
+        </p:style>
+      </p:cxnSp>
+      <p:cxnSp>
+        <p:nvCxnSpPr>
+          <p:cNvPr id="68" name="Conector de Seta Reta 67">
+            <a:extLst>
+              <a:ext uri="{FF2B5EF4-FFF2-40B4-BE49-F238E27FC236}">
+                <a16:creationId xmlns:a16="http://schemas.microsoft.com/office/drawing/2014/main" id="{A4A56361-DC8B-B2ED-124F-041B4554F4BF}"/>
+              </a:ext>
+            </a:extLst>
+          </p:cNvPr>
+          <p:cNvCxnSpPr>
+            <a:cxnSpLocks/>
+          </p:cNvCxnSpPr>
+          <p:nvPr/>
+        </p:nvCxnSpPr>
+        <p:spPr>
+          <a:xfrm flipH="1">
+            <a:off x="9746316" y="7062251"/>
+            <a:ext cx="415810" cy="0"/>
+          </a:xfrm>
+          <a:prstGeom prst="straightConnector1">
+            <a:avLst/>
+          </a:prstGeom>
+          <a:ln w="38100">
+            <a:solidFill>
+              <a:schemeClr val="bg2">
+                <a:lumMod val="25000"/>
+              </a:schemeClr>
+            </a:solidFill>
+            <a:tailEnd type="triangle"/>
+          </a:ln>
+        </p:spPr>
+        <p:style>
+          <a:lnRef idx="1">
+            <a:schemeClr val="accent1"/>
+          </a:lnRef>
+          <a:fillRef idx="0">
+            <a:schemeClr val="accent1"/>
+          </a:fillRef>
+          <a:effectRef idx="0">
+            <a:schemeClr val="accent1"/>
+          </a:effectRef>
+          <a:fontRef idx="minor">
+            <a:schemeClr val="tx1"/>
+          </a:fontRef>
+        </p:style>
+      </p:cxnSp>
+      <p:cxnSp>
+        <p:nvCxnSpPr>
+          <p:cNvPr id="69" name="Conector reto 68">
+            <a:extLst>
+              <a:ext uri="{FF2B5EF4-FFF2-40B4-BE49-F238E27FC236}">
+                <a16:creationId xmlns:a16="http://schemas.microsoft.com/office/drawing/2014/main" id="{1CCDECBF-8D94-F936-E449-1E73CEA6EC33}"/>
+              </a:ext>
+            </a:extLst>
+          </p:cNvPr>
+          <p:cNvCxnSpPr>
+            <a:cxnSpLocks/>
+          </p:cNvCxnSpPr>
+          <p:nvPr/>
+        </p:nvCxnSpPr>
+        <p:spPr>
+          <a:xfrm>
+            <a:off x="9494520" y="4313259"/>
+            <a:ext cx="673509" cy="0"/>
+          </a:xfrm>
+          <a:prstGeom prst="line">
+            <a:avLst/>
+          </a:prstGeom>
+          <a:ln w="38100">
+            <a:solidFill>
+              <a:schemeClr val="bg2">
+                <a:lumMod val="25000"/>
+              </a:schemeClr>
+            </a:solidFill>
+            <a:headEnd type="oval" w="med" len="med"/>
+            <a:tailEnd type="none" w="med" len="med"/>
+          </a:ln>
+        </p:spPr>
+        <p:style>
+          <a:lnRef idx="1">
+            <a:schemeClr val="accent1"/>
+          </a:lnRef>
+          <a:fillRef idx="0">
+            <a:schemeClr val="accent1"/>
+          </a:fillRef>
+          <a:effectRef idx="0">
+            <a:schemeClr val="accent1"/>
+          </a:effectRef>
+          <a:fontRef idx="minor">
+            <a:schemeClr val="tx1"/>
+          </a:fontRef>
+        </p:style>
+      </p:cxnSp>
+      <p:cxnSp>
+        <p:nvCxnSpPr>
+          <p:cNvPr id="70" name="Conector reto 69">
+            <a:extLst>
+              <a:ext uri="{FF2B5EF4-FFF2-40B4-BE49-F238E27FC236}">
+                <a16:creationId xmlns:a16="http://schemas.microsoft.com/office/drawing/2014/main" id="{588D99B9-3E74-3AED-1ACA-EFF779BC7F2C}"/>
+              </a:ext>
+            </a:extLst>
+          </p:cNvPr>
+          <p:cNvCxnSpPr>
+            <a:cxnSpLocks/>
+          </p:cNvCxnSpPr>
+          <p:nvPr/>
+        </p:nvCxnSpPr>
+        <p:spPr>
+          <a:xfrm flipH="1" flipV="1">
+            <a:off x="10162126" y="4294580"/>
+            <a:ext cx="0" cy="2784640"/>
+          </a:xfrm>
+          <a:prstGeom prst="line">
+            <a:avLst/>
+          </a:prstGeom>
+          <a:ln w="38100">
+            <a:solidFill>
+              <a:schemeClr val="bg2">
+                <a:lumMod val="25000"/>
+              </a:schemeClr>
+            </a:solidFill>
+            <a:headEnd type="none" w="med" len="med"/>
+            <a:tailEnd type="none" w="med" len="med"/>
+          </a:ln>
+        </p:spPr>
+        <p:style>
+          <a:lnRef idx="1">
+            <a:schemeClr val="accent1"/>
+          </a:lnRef>
+          <a:fillRef idx="0">
+            <a:schemeClr val="accent1"/>
+          </a:fillRef>
+          <a:effectRef idx="0">
+            <a:schemeClr val="accent1"/>
+          </a:effectRef>
+          <a:fontRef idx="minor">
+            <a:schemeClr val="tx1"/>
+          </a:fontRef>
+        </p:style>
+      </p:cxnSp>
+      <p:cxnSp>
+        <p:nvCxnSpPr>
+          <p:cNvPr id="73" name="Conector de Seta Reta 72">
+            <a:extLst>
+              <a:ext uri="{FF2B5EF4-FFF2-40B4-BE49-F238E27FC236}">
+                <a16:creationId xmlns:a16="http://schemas.microsoft.com/office/drawing/2014/main" id="{0FCCB4F4-DB0A-9321-A747-49166180622A}"/>
+              </a:ext>
+            </a:extLst>
+          </p:cNvPr>
+          <p:cNvCxnSpPr>
+            <a:cxnSpLocks/>
+          </p:cNvCxnSpPr>
+          <p:nvPr/>
+        </p:nvCxnSpPr>
+        <p:spPr>
+          <a:xfrm>
+            <a:off x="8876687" y="5035876"/>
+            <a:ext cx="0" cy="980231"/>
+          </a:xfrm>
+          <a:prstGeom prst="straightConnector1">
+            <a:avLst/>
+          </a:prstGeom>
+          <a:ln w="38100">
+            <a:solidFill>
+              <a:schemeClr val="bg2">
+                <a:lumMod val="25000"/>
+              </a:schemeClr>
+            </a:solidFill>
+            <a:headEnd type="oval" w="med" len="med"/>
+            <a:tailEnd type="triangle" w="med" len="med"/>
+          </a:ln>
+        </p:spPr>
+        <p:style>
+          <a:lnRef idx="1">
+            <a:schemeClr val="accent1"/>
+          </a:lnRef>
+          <a:fillRef idx="0">
+            <a:schemeClr val="accent1"/>
+          </a:fillRef>
+          <a:effectRef idx="0">
+            <a:schemeClr val="accent1"/>
+          </a:effectRef>
+          <a:fontRef idx="minor">
+            <a:schemeClr val="tx1"/>
+          </a:fontRef>
+        </p:style>
+      </p:cxnSp>
+      <p:cxnSp>
+        <p:nvCxnSpPr>
+          <p:cNvPr id="76" name="Conector de Seta Reta 75">
+            <a:extLst>
+              <a:ext uri="{FF2B5EF4-FFF2-40B4-BE49-F238E27FC236}">
+                <a16:creationId xmlns:a16="http://schemas.microsoft.com/office/drawing/2014/main" id="{96E538A7-8A5B-93CE-5488-F6F65C033C65}"/>
+              </a:ext>
+            </a:extLst>
+          </p:cNvPr>
+          <p:cNvCxnSpPr>
+            <a:cxnSpLocks/>
+          </p:cNvCxnSpPr>
+          <p:nvPr/>
+        </p:nvCxnSpPr>
+        <p:spPr>
+          <a:xfrm>
+            <a:off x="8695121" y="4465320"/>
+            <a:ext cx="0" cy="1550786"/>
+          </a:xfrm>
+          <a:prstGeom prst="straightConnector1">
+            <a:avLst/>
+          </a:prstGeom>
+          <a:ln w="38100">
+            <a:solidFill>
+              <a:schemeClr val="bg2">
+                <a:lumMod val="25000"/>
+              </a:schemeClr>
+            </a:solidFill>
+            <a:headEnd type="oval" w="med" len="med"/>
+            <a:tailEnd type="triangle" w="med" len="med"/>
+          </a:ln>
+        </p:spPr>
+        <p:style>
+          <a:lnRef idx="1">
+            <a:schemeClr val="accent1"/>
+          </a:lnRef>
+          <a:fillRef idx="0">
+            <a:schemeClr val="accent1"/>
+          </a:fillRef>
+          <a:effectRef idx="0">
+            <a:schemeClr val="accent1"/>
+          </a:effectRef>
+          <a:fontRef idx="minor">
+            <a:schemeClr val="tx1"/>
+          </a:fontRef>
+        </p:style>
+      </p:cxnSp>
+      <p:cxnSp>
+        <p:nvCxnSpPr>
+          <p:cNvPr id="79" name="Conector de Seta Reta 78">
+            <a:extLst>
+              <a:ext uri="{FF2B5EF4-FFF2-40B4-BE49-F238E27FC236}">
+                <a16:creationId xmlns:a16="http://schemas.microsoft.com/office/drawing/2014/main" id="{D272DB7B-A536-8EF7-4FD2-41715E02F7A9}"/>
+              </a:ext>
+            </a:extLst>
+          </p:cNvPr>
+          <p:cNvCxnSpPr>
+            <a:cxnSpLocks/>
+          </p:cNvCxnSpPr>
+          <p:nvPr/>
+        </p:nvCxnSpPr>
+        <p:spPr>
+          <a:xfrm>
+            <a:off x="8504621" y="3826355"/>
+            <a:ext cx="0" cy="2189751"/>
+          </a:xfrm>
+          <a:prstGeom prst="straightConnector1">
+            <a:avLst/>
+          </a:prstGeom>
+          <a:ln w="38100">
+            <a:solidFill>
+              <a:schemeClr val="bg2">
+                <a:lumMod val="25000"/>
+              </a:schemeClr>
+            </a:solidFill>
+            <a:headEnd type="oval" w="med" len="med"/>
+            <a:tailEnd type="triangle" w="med" len="med"/>
           </a:ln>
         </p:spPr>
         <p:style>
@@ -4917,6 +5892,21 @@
 </file>
 
 <file path=customXml/item1.xml><?xml version="1.0" encoding="utf-8"?>
+<p:properties xmlns:p="http://schemas.microsoft.com/office/2006/metadata/properties" xmlns:xsi="http://www.w3.org/2001/XMLSchema-instance" xmlns:pc="http://schemas.microsoft.com/office/infopath/2007/PartnerControls">
+  <documentManagement/>
+</p:properties>
+</file>
+
+<file path=customXml/item2.xml><?xml version="1.0" encoding="utf-8"?>
+<?mso-contentType ?>
+<FormTemplates xmlns="http://schemas.microsoft.com/sharepoint/v3/contenttype/forms">
+  <Display>DocumentLibraryForm</Display>
+  <Edit>DocumentLibraryForm</Edit>
+  <New>DocumentLibraryForm</New>
+</FormTemplates>
+</file>
+
+<file path=customXml/item3.xml><?xml version="1.0" encoding="utf-8"?>
 <ct:contentTypeSchema xmlns:ct="http://schemas.microsoft.com/office/2006/metadata/contentType" xmlns:ma="http://schemas.microsoft.com/office/2006/metadata/properties/metaAttributes" ct:_="" ma:_="" ma:contentTypeName="Documento" ma:contentTypeID="0x010100DEB1892306AA484AB9D75A4CDF608FA6" ma:contentTypeVersion="4" ma:contentTypeDescription="Crie um novo documento." ma:contentTypeScope="" ma:versionID="396b07493731c5e6b2c35eac9345b5b2">
   <xsd:schema xmlns:xsd="http://www.w3.org/2001/XMLSchema" xmlns:xs="http://www.w3.org/2001/XMLSchema" xmlns:p="http://schemas.microsoft.com/office/2006/metadata/properties" xmlns:ns2="29422375-733d-49e6-bd76-29d3643b312c" targetNamespace="http://schemas.microsoft.com/office/2006/metadata/properties" ma:root="true" ma:fieldsID="54b59f98ec6c389047181fbb499016ac" ns2:_="">
     <xsd:import namespace="29422375-733d-49e6-bd76-29d3643b312c"/>
@@ -5060,29 +6050,37 @@
 </ct:contentTypeSchema>
 </file>
 
-<file path=customXml/item2.xml><?xml version="1.0" encoding="utf-8"?>
-<?mso-contentType ?>
-<FormTemplates xmlns="http://schemas.microsoft.com/sharepoint/v3/contenttype/forms">
-  <Display>DocumentLibraryForm</Display>
-  <Edit>DocumentLibraryForm</Edit>
-  <New>DocumentLibraryForm</New>
-</FormTemplates>
-</file>
-
-<file path=customXml/item3.xml><?xml version="1.0" encoding="utf-8"?>
-<p:properties xmlns:p="http://schemas.microsoft.com/office/2006/metadata/properties" xmlns:xsi="http://www.w3.org/2001/XMLSchema-instance" xmlns:pc="http://schemas.microsoft.com/office/infopath/2007/PartnerControls">
-  <documentManagement/>
-</p:properties>
-</file>
-
 <file path=customXml/itemProps1.xml><?xml version="1.0" encoding="utf-8"?>
-<ds:datastoreItem xmlns:ds="http://schemas.openxmlformats.org/officeDocument/2006/customXml" ds:itemID="{8A6D5685-408E-4A1D-93A9-9BE8AF456DD3}"/>
+<ds:datastoreItem xmlns:ds="http://schemas.openxmlformats.org/officeDocument/2006/customXml" ds:itemID="{018BFCD5-755B-497F-8959-2A361FF8E605}">
+  <ds:schemaRefs>
+    <ds:schemaRef ds:uri="http://schemas.microsoft.com/office/2006/metadata/properties"/>
+    <ds:schemaRef ds:uri="http://schemas.microsoft.com/office/infopath/2007/PartnerControls"/>
+  </ds:schemaRefs>
+</ds:datastoreItem>
 </file>
 
 <file path=customXml/itemProps2.xml><?xml version="1.0" encoding="utf-8"?>
-<ds:datastoreItem xmlns:ds="http://schemas.openxmlformats.org/officeDocument/2006/customXml" ds:itemID="{4BCA8E21-EC9D-4C20-9C69-16A68CA4B33F}"/>
+<ds:datastoreItem xmlns:ds="http://schemas.openxmlformats.org/officeDocument/2006/customXml" ds:itemID="{4BCA8E21-EC9D-4C20-9C69-16A68CA4B33F}">
+  <ds:schemaRefs>
+    <ds:schemaRef ds:uri="http://schemas.microsoft.com/sharepoint/v3/contenttype/forms"/>
+  </ds:schemaRefs>
+</ds:datastoreItem>
 </file>
 
 <file path=customXml/itemProps3.xml><?xml version="1.0" encoding="utf-8"?>
-<ds:datastoreItem xmlns:ds="http://schemas.openxmlformats.org/officeDocument/2006/customXml" ds:itemID="{018BFCD5-755B-497F-8959-2A361FF8E605}"/>
+<ds:datastoreItem xmlns:ds="http://schemas.openxmlformats.org/officeDocument/2006/customXml" ds:itemID="{8A6D5685-408E-4A1D-93A9-9BE8AF456DD3}">
+  <ds:schemaRefs>
+    <ds:schemaRef ds:uri="http://schemas.microsoft.com/office/2006/metadata/contentType"/>
+    <ds:schemaRef ds:uri="http://schemas.microsoft.com/office/2006/metadata/properties/metaAttributes"/>
+    <ds:schemaRef ds:uri="http://www.w3.org/2001/XMLSchema"/>
+    <ds:schemaRef ds:uri="http://schemas.microsoft.com/office/2006/metadata/properties"/>
+    <ds:schemaRef ds:uri="29422375-733d-49e6-bd76-29d3643b312c"/>
+    <ds:schemaRef ds:uri="http://schemas.microsoft.com/office/2006/documentManagement/types"/>
+    <ds:schemaRef ds:uri="http://schemas.microsoft.com/office/infopath/2007/PartnerControls"/>
+    <ds:schemaRef ds:uri="http://schemas.openxmlformats.org/package/2006/metadata/core-properties"/>
+    <ds:schemaRef ds:uri="http://purl.org/dc/elements/1.1/"/>
+    <ds:schemaRef ds:uri="http://purl.org/dc/terms/"/>
+    <ds:schemaRef ds:uri="http://schemas.microsoft.com/internal/obd"/>
+  </ds:schemaRefs>
+</ds:datastoreItem>
 </file>
</xml_diff>

<commit_message>
Atualização do fluxo de usuário
</commit_message>
<xml_diff>
--- a/docs/Fluxo de usuário.pptx
+++ b/docs/Fluxo de usuário.pptx
@@ -116,13 +116,333 @@
 <file path=ppt/revisionInfo.xml><?xml version="1.0" encoding="utf-8"?>
 <p1510:revInfo xmlns:a="http://schemas.openxmlformats.org/drawingml/2006/main" xmlns:r="http://schemas.openxmlformats.org/officeDocument/2006/relationships" xmlns:p1510="http://schemas.microsoft.com/office/powerpoint/2015/10/main">
   <p1510:revLst>
-    <p1510:client id="{D2BFB781-41E8-44D7-8625-CC045B935F9E}" v="17" dt="2022-10-08T02:26:24.968"/>
+    <p1510:client id="{8BD699FA-D9F7-437C-B571-0C994CF864F7}" v="4" dt="2022-11-19T22:06:54.314"/>
   </p1510:revLst>
 </p1510:revInfo>
 </file>
 
 <file path=ppt/changesInfos/changesInfo1.xml><?xml version="1.0" encoding="utf-8"?>
 <pc:chgInfo xmlns:a="http://schemas.openxmlformats.org/drawingml/2006/main" xmlns:r="http://schemas.openxmlformats.org/officeDocument/2006/relationships" xmlns:ac="http://schemas.microsoft.com/office/drawing/2013/main/command" xmlns:pc="http://schemas.microsoft.com/office/powerpoint/2013/main/command">
+  <pc:docChgLst>
+    <pc:chgData name="Flavio Martins Da Cruz" userId="7dbe8e30-2e97-43ef-8040-520ddcc14afe" providerId="ADAL" clId="{8BD699FA-D9F7-437C-B571-0C994CF864F7}"/>
+    <pc:docChg chg="undo custSel modSld">
+      <pc:chgData name="Flavio Martins Da Cruz" userId="7dbe8e30-2e97-43ef-8040-520ddcc14afe" providerId="ADAL" clId="{8BD699FA-D9F7-437C-B571-0C994CF864F7}" dt="2022-11-19T22:07:14.972" v="37" actId="14100"/>
+      <pc:docMkLst>
+        <pc:docMk/>
+      </pc:docMkLst>
+      <pc:sldChg chg="addSp delSp modSp mod">
+        <pc:chgData name="Flavio Martins Da Cruz" userId="7dbe8e30-2e97-43ef-8040-520ddcc14afe" providerId="ADAL" clId="{8BD699FA-D9F7-437C-B571-0C994CF864F7}" dt="2022-11-19T22:07:14.972" v="37" actId="14100"/>
+        <pc:sldMkLst>
+          <pc:docMk/>
+          <pc:sldMk cId="2395916845" sldId="256"/>
+        </pc:sldMkLst>
+        <pc:spChg chg="mod">
+          <ac:chgData name="Flavio Martins Da Cruz" userId="7dbe8e30-2e97-43ef-8040-520ddcc14afe" providerId="ADAL" clId="{8BD699FA-D9F7-437C-B571-0C994CF864F7}" dt="2022-11-19T22:06:32.608" v="24" actId="1076"/>
+          <ac:spMkLst>
+            <pc:docMk/>
+            <pc:sldMk cId="2395916845" sldId="256"/>
+            <ac:spMk id="16" creationId="{A9403D74-F1A1-732C-3E18-584A6315034C}"/>
+          </ac:spMkLst>
+        </pc:spChg>
+        <pc:spChg chg="mod">
+          <ac:chgData name="Flavio Martins Da Cruz" userId="7dbe8e30-2e97-43ef-8040-520ddcc14afe" providerId="ADAL" clId="{8BD699FA-D9F7-437C-B571-0C994CF864F7}" dt="2022-11-19T22:06:32.608" v="24" actId="1076"/>
+          <ac:spMkLst>
+            <pc:docMk/>
+            <pc:sldMk cId="2395916845" sldId="256"/>
+            <ac:spMk id="17" creationId="{6F84DE76-0FE5-FAC9-50C4-E30EA0585016}"/>
+          </ac:spMkLst>
+        </pc:spChg>
+        <pc:spChg chg="mod">
+          <ac:chgData name="Flavio Martins Da Cruz" userId="7dbe8e30-2e97-43ef-8040-520ddcc14afe" providerId="ADAL" clId="{8BD699FA-D9F7-437C-B571-0C994CF864F7}" dt="2022-11-19T22:06:32.608" v="24" actId="1076"/>
+          <ac:spMkLst>
+            <pc:docMk/>
+            <pc:sldMk cId="2395916845" sldId="256"/>
+            <ac:spMk id="18" creationId="{9CBDEA53-9AA6-F1D1-E006-DECA1A44624C}"/>
+          </ac:spMkLst>
+        </pc:spChg>
+        <pc:spChg chg="mod">
+          <ac:chgData name="Flavio Martins Da Cruz" userId="7dbe8e30-2e97-43ef-8040-520ddcc14afe" providerId="ADAL" clId="{8BD699FA-D9F7-437C-B571-0C994CF864F7}" dt="2022-11-19T22:06:27.289" v="23" actId="1076"/>
+          <ac:spMkLst>
+            <pc:docMk/>
+            <pc:sldMk cId="2395916845" sldId="256"/>
+            <ac:spMk id="19" creationId="{20FFD135-2202-C186-A5A2-DDF26808A23A}"/>
+          </ac:spMkLst>
+        </pc:spChg>
+        <pc:spChg chg="mod">
+          <ac:chgData name="Flavio Martins Da Cruz" userId="7dbe8e30-2e97-43ef-8040-520ddcc14afe" providerId="ADAL" clId="{8BD699FA-D9F7-437C-B571-0C994CF864F7}" dt="2022-11-19T22:06:27.289" v="23" actId="1076"/>
+          <ac:spMkLst>
+            <pc:docMk/>
+            <pc:sldMk cId="2395916845" sldId="256"/>
+            <ac:spMk id="20" creationId="{9006700E-3136-B805-6711-AD13B68276DA}"/>
+          </ac:spMkLst>
+        </pc:spChg>
+        <pc:spChg chg="mod">
+          <ac:chgData name="Flavio Martins Da Cruz" userId="7dbe8e30-2e97-43ef-8040-520ddcc14afe" providerId="ADAL" clId="{8BD699FA-D9F7-437C-B571-0C994CF864F7}" dt="2022-11-19T22:06:32.608" v="24" actId="1076"/>
+          <ac:spMkLst>
+            <pc:docMk/>
+            <pc:sldMk cId="2395916845" sldId="256"/>
+            <ac:spMk id="21" creationId="{47D0D986-71CC-CB00-FC92-272AA90AC894}"/>
+          </ac:spMkLst>
+        </pc:spChg>
+        <pc:spChg chg="add mod">
+          <ac:chgData name="Flavio Martins Da Cruz" userId="7dbe8e30-2e97-43ef-8040-520ddcc14afe" providerId="ADAL" clId="{8BD699FA-D9F7-437C-B571-0C994CF864F7}" dt="2022-11-19T22:06:50.131" v="32" actId="20577"/>
+          <ac:spMkLst>
+            <pc:docMk/>
+            <pc:sldMk cId="2395916845" sldId="256"/>
+            <ac:spMk id="25" creationId="{3592BA16-998F-4F54-DA25-302588758B15}"/>
+          </ac:spMkLst>
+        </pc:spChg>
+        <pc:picChg chg="add mod ord">
+          <ac:chgData name="Flavio Martins Da Cruz" userId="7dbe8e30-2e97-43ef-8040-520ddcc14afe" providerId="ADAL" clId="{8BD699FA-D9F7-437C-B571-0C994CF864F7}" dt="2022-11-19T22:06:32.608" v="24" actId="1076"/>
+          <ac:picMkLst>
+            <pc:docMk/>
+            <pc:sldMk cId="2395916845" sldId="256"/>
+            <ac:picMk id="3" creationId="{47541BB9-042E-3957-A965-AA5F9B88F1F4}"/>
+          </ac:picMkLst>
+        </pc:picChg>
+        <pc:picChg chg="del">
+          <ac:chgData name="Flavio Martins Da Cruz" userId="7dbe8e30-2e97-43ef-8040-520ddcc14afe" providerId="ADAL" clId="{8BD699FA-D9F7-437C-B571-0C994CF864F7}" dt="2022-11-19T21:52:58.762" v="3" actId="478"/>
+          <ac:picMkLst>
+            <pc:docMk/>
+            <pc:sldMk cId="2395916845" sldId="256"/>
+            <ac:picMk id="5" creationId="{E22DD8CB-8FE8-7C8C-7206-5E678F220C1A}"/>
+          </ac:picMkLst>
+        </pc:picChg>
+        <pc:picChg chg="mod">
+          <ac:chgData name="Flavio Martins Da Cruz" userId="7dbe8e30-2e97-43ef-8040-520ddcc14afe" providerId="ADAL" clId="{8BD699FA-D9F7-437C-B571-0C994CF864F7}" dt="2022-11-19T22:06:32.608" v="24" actId="1076"/>
+          <ac:picMkLst>
+            <pc:docMk/>
+            <pc:sldMk cId="2395916845" sldId="256"/>
+            <ac:picMk id="7" creationId="{806CD202-9324-B714-D05E-FFE5FF736DFC}"/>
+          </ac:picMkLst>
+        </pc:picChg>
+        <pc:picChg chg="mod">
+          <ac:chgData name="Flavio Martins Da Cruz" userId="7dbe8e30-2e97-43ef-8040-520ddcc14afe" providerId="ADAL" clId="{8BD699FA-D9F7-437C-B571-0C994CF864F7}" dt="2022-11-19T22:06:32.608" v="24" actId="1076"/>
+          <ac:picMkLst>
+            <pc:docMk/>
+            <pc:sldMk cId="2395916845" sldId="256"/>
+            <ac:picMk id="9" creationId="{6A1F6BAE-5505-22A0-3AC7-BCA9326ED2F0}"/>
+          </ac:picMkLst>
+        </pc:picChg>
+        <pc:picChg chg="mod">
+          <ac:chgData name="Flavio Martins Da Cruz" userId="7dbe8e30-2e97-43ef-8040-520ddcc14afe" providerId="ADAL" clId="{8BD699FA-D9F7-437C-B571-0C994CF864F7}" dt="2022-11-19T22:06:27.289" v="23" actId="1076"/>
+          <ac:picMkLst>
+            <pc:docMk/>
+            <pc:sldMk cId="2395916845" sldId="256"/>
+            <ac:picMk id="11" creationId="{B184C643-F062-9B5B-B1E3-E86BB6CCB4E0}"/>
+          </ac:picMkLst>
+        </pc:picChg>
+        <pc:picChg chg="mod">
+          <ac:chgData name="Flavio Martins Da Cruz" userId="7dbe8e30-2e97-43ef-8040-520ddcc14afe" providerId="ADAL" clId="{8BD699FA-D9F7-437C-B571-0C994CF864F7}" dt="2022-11-19T22:06:27.289" v="23" actId="1076"/>
+          <ac:picMkLst>
+            <pc:docMk/>
+            <pc:sldMk cId="2395916845" sldId="256"/>
+            <ac:picMk id="13" creationId="{C3B028AD-F830-7C87-B6A6-A01900F91710}"/>
+          </ac:picMkLst>
+        </pc:picChg>
+        <pc:picChg chg="add mod">
+          <ac:chgData name="Flavio Martins Da Cruz" userId="7dbe8e30-2e97-43ef-8040-520ddcc14afe" providerId="ADAL" clId="{8BD699FA-D9F7-437C-B571-0C994CF864F7}" dt="2022-11-19T22:06:42.912" v="26" actId="1076"/>
+          <ac:picMkLst>
+            <pc:docMk/>
+            <pc:sldMk cId="2395916845" sldId="256"/>
+            <ac:picMk id="14" creationId="{90AC8568-23AC-3F98-5DF0-D27AAC52D91A}"/>
+          </ac:picMkLst>
+        </pc:picChg>
+        <pc:picChg chg="mod">
+          <ac:chgData name="Flavio Martins Da Cruz" userId="7dbe8e30-2e97-43ef-8040-520ddcc14afe" providerId="ADAL" clId="{8BD699FA-D9F7-437C-B571-0C994CF864F7}" dt="2022-11-19T22:06:32.608" v="24" actId="1076"/>
+          <ac:picMkLst>
+            <pc:docMk/>
+            <pc:sldMk cId="2395916845" sldId="256"/>
+            <ac:picMk id="15" creationId="{BFB783C5-2A2B-F993-B6C2-2BA1FA85125D}"/>
+          </ac:picMkLst>
+        </pc:picChg>
+        <pc:cxnChg chg="mod">
+          <ac:chgData name="Flavio Martins Da Cruz" userId="7dbe8e30-2e97-43ef-8040-520ddcc14afe" providerId="ADAL" clId="{8BD699FA-D9F7-437C-B571-0C994CF864F7}" dt="2022-11-19T22:06:32.608" v="24" actId="1076"/>
+          <ac:cxnSpMkLst>
+            <pc:docMk/>
+            <pc:sldMk cId="2395916845" sldId="256"/>
+            <ac:cxnSpMk id="23" creationId="{BEDA2239-D6AB-3858-4C40-A1C8A38B45D3}"/>
+          </ac:cxnSpMkLst>
+        </pc:cxnChg>
+        <pc:cxnChg chg="mod">
+          <ac:chgData name="Flavio Martins Da Cruz" userId="7dbe8e30-2e97-43ef-8040-520ddcc14afe" providerId="ADAL" clId="{8BD699FA-D9F7-437C-B571-0C994CF864F7}" dt="2022-11-19T22:06:32.608" v="24" actId="1076"/>
+          <ac:cxnSpMkLst>
+            <pc:docMk/>
+            <pc:sldMk cId="2395916845" sldId="256"/>
+            <ac:cxnSpMk id="24" creationId="{9545299F-BA75-2AAE-D04D-A2B2FF3CB2ED}"/>
+          </ac:cxnSpMkLst>
+        </pc:cxnChg>
+        <pc:cxnChg chg="add mod">
+          <ac:chgData name="Flavio Martins Da Cruz" userId="7dbe8e30-2e97-43ef-8040-520ddcc14afe" providerId="ADAL" clId="{8BD699FA-D9F7-437C-B571-0C994CF864F7}" dt="2022-11-19T22:07:02.198" v="35" actId="14100"/>
+          <ac:cxnSpMkLst>
+            <pc:docMk/>
+            <pc:sldMk cId="2395916845" sldId="256"/>
+            <ac:cxnSpMk id="26" creationId="{6E21D379-3F43-3BAF-F904-E473FC365253}"/>
+          </ac:cxnSpMkLst>
+        </pc:cxnChg>
+        <pc:cxnChg chg="mod">
+          <ac:chgData name="Flavio Martins Da Cruz" userId="7dbe8e30-2e97-43ef-8040-520ddcc14afe" providerId="ADAL" clId="{8BD699FA-D9F7-437C-B571-0C994CF864F7}" dt="2022-11-19T22:07:14.972" v="37" actId="14100"/>
+          <ac:cxnSpMkLst>
+            <pc:docMk/>
+            <pc:sldMk cId="2395916845" sldId="256"/>
+            <ac:cxnSpMk id="27" creationId="{0DE54EA8-3175-B4D2-686D-F2B95C358637}"/>
+          </ac:cxnSpMkLst>
+        </pc:cxnChg>
+        <pc:cxnChg chg="mod">
+          <ac:chgData name="Flavio Martins Da Cruz" userId="7dbe8e30-2e97-43ef-8040-520ddcc14afe" providerId="ADAL" clId="{8BD699FA-D9F7-437C-B571-0C994CF864F7}" dt="2022-11-19T22:06:32.608" v="24" actId="1076"/>
+          <ac:cxnSpMkLst>
+            <pc:docMk/>
+            <pc:sldMk cId="2395916845" sldId="256"/>
+            <ac:cxnSpMk id="32" creationId="{74D50FA1-BF46-1308-454A-1E83526B985A}"/>
+          </ac:cxnSpMkLst>
+        </pc:cxnChg>
+        <pc:cxnChg chg="mod">
+          <ac:chgData name="Flavio Martins Da Cruz" userId="7dbe8e30-2e97-43ef-8040-520ddcc14afe" providerId="ADAL" clId="{8BD699FA-D9F7-437C-B571-0C994CF864F7}" dt="2022-11-19T22:06:32.608" v="24" actId="1076"/>
+          <ac:cxnSpMkLst>
+            <pc:docMk/>
+            <pc:sldMk cId="2395916845" sldId="256"/>
+            <ac:cxnSpMk id="41" creationId="{ED1F6B31-E224-F767-79F9-C86050647E01}"/>
+          </ac:cxnSpMkLst>
+        </pc:cxnChg>
+        <pc:cxnChg chg="mod">
+          <ac:chgData name="Flavio Martins Da Cruz" userId="7dbe8e30-2e97-43ef-8040-520ddcc14afe" providerId="ADAL" clId="{8BD699FA-D9F7-437C-B571-0C994CF864F7}" dt="2022-11-19T22:06:27.289" v="23" actId="1076"/>
+          <ac:cxnSpMkLst>
+            <pc:docMk/>
+            <pc:sldMk cId="2395916845" sldId="256"/>
+            <ac:cxnSpMk id="46" creationId="{D3D2CEB3-E802-78B1-E49E-5492AC39C1B9}"/>
+          </ac:cxnSpMkLst>
+        </pc:cxnChg>
+        <pc:cxnChg chg="mod">
+          <ac:chgData name="Flavio Martins Da Cruz" userId="7dbe8e30-2e97-43ef-8040-520ddcc14afe" providerId="ADAL" clId="{8BD699FA-D9F7-437C-B571-0C994CF864F7}" dt="2022-11-19T22:06:27.289" v="23" actId="1076"/>
+          <ac:cxnSpMkLst>
+            <pc:docMk/>
+            <pc:sldMk cId="2395916845" sldId="256"/>
+            <ac:cxnSpMk id="47" creationId="{F549FB57-22E3-6624-6476-C9F5D6D59838}"/>
+          </ac:cxnSpMkLst>
+        </pc:cxnChg>
+        <pc:cxnChg chg="mod">
+          <ac:chgData name="Flavio Martins Da Cruz" userId="7dbe8e30-2e97-43ef-8040-520ddcc14afe" providerId="ADAL" clId="{8BD699FA-D9F7-437C-B571-0C994CF864F7}" dt="2022-11-19T22:06:27.289" v="23" actId="1076"/>
+          <ac:cxnSpMkLst>
+            <pc:docMk/>
+            <pc:sldMk cId="2395916845" sldId="256"/>
+            <ac:cxnSpMk id="51" creationId="{1DB3AFC0-BE1A-6D64-FCE3-5C34C42DDE20}"/>
+          </ac:cxnSpMkLst>
+        </pc:cxnChg>
+        <pc:cxnChg chg="mod">
+          <ac:chgData name="Flavio Martins Da Cruz" userId="7dbe8e30-2e97-43ef-8040-520ddcc14afe" providerId="ADAL" clId="{8BD699FA-D9F7-437C-B571-0C994CF864F7}" dt="2022-11-19T22:06:27.289" v="23" actId="1076"/>
+          <ac:cxnSpMkLst>
+            <pc:docMk/>
+            <pc:sldMk cId="2395916845" sldId="256"/>
+            <ac:cxnSpMk id="52" creationId="{92400E6F-D17D-89D2-B0EA-94EA0AD6E03D}"/>
+          </ac:cxnSpMkLst>
+        </pc:cxnChg>
+        <pc:cxnChg chg="mod">
+          <ac:chgData name="Flavio Martins Da Cruz" userId="7dbe8e30-2e97-43ef-8040-520ddcc14afe" providerId="ADAL" clId="{8BD699FA-D9F7-437C-B571-0C994CF864F7}" dt="2022-11-19T22:06:27.289" v="23" actId="1076"/>
+          <ac:cxnSpMkLst>
+            <pc:docMk/>
+            <pc:sldMk cId="2395916845" sldId="256"/>
+            <ac:cxnSpMk id="58" creationId="{93CA95B1-CAE2-9F51-F73F-4A983FE82DE5}"/>
+          </ac:cxnSpMkLst>
+        </pc:cxnChg>
+        <pc:cxnChg chg="mod">
+          <ac:chgData name="Flavio Martins Da Cruz" userId="7dbe8e30-2e97-43ef-8040-520ddcc14afe" providerId="ADAL" clId="{8BD699FA-D9F7-437C-B571-0C994CF864F7}" dt="2022-11-19T22:06:27.289" v="23" actId="1076"/>
+          <ac:cxnSpMkLst>
+            <pc:docMk/>
+            <pc:sldMk cId="2395916845" sldId="256"/>
+            <ac:cxnSpMk id="59" creationId="{59160EB9-9FF4-B8CF-B566-3BBE748F524C}"/>
+          </ac:cxnSpMkLst>
+        </pc:cxnChg>
+        <pc:cxnChg chg="mod">
+          <ac:chgData name="Flavio Martins Da Cruz" userId="7dbe8e30-2e97-43ef-8040-520ddcc14afe" providerId="ADAL" clId="{8BD699FA-D9F7-437C-B571-0C994CF864F7}" dt="2022-11-19T22:06:27.289" v="23" actId="1076"/>
+          <ac:cxnSpMkLst>
+            <pc:docMk/>
+            <pc:sldMk cId="2395916845" sldId="256"/>
+            <ac:cxnSpMk id="60" creationId="{92C4D408-7A7B-5089-E838-0489422B0F22}"/>
+          </ac:cxnSpMkLst>
+        </pc:cxnChg>
+        <pc:cxnChg chg="mod">
+          <ac:chgData name="Flavio Martins Da Cruz" userId="7dbe8e30-2e97-43ef-8040-520ddcc14afe" providerId="ADAL" clId="{8BD699FA-D9F7-437C-B571-0C994CF864F7}" dt="2022-11-19T22:06:27.289" v="23" actId="1076"/>
+          <ac:cxnSpMkLst>
+            <pc:docMk/>
+            <pc:sldMk cId="2395916845" sldId="256"/>
+            <ac:cxnSpMk id="63" creationId="{0BD8365D-CF5E-42C7-A81D-4A0181080EA8}"/>
+          </ac:cxnSpMkLst>
+        </pc:cxnChg>
+        <pc:cxnChg chg="mod">
+          <ac:chgData name="Flavio Martins Da Cruz" userId="7dbe8e30-2e97-43ef-8040-520ddcc14afe" providerId="ADAL" clId="{8BD699FA-D9F7-437C-B571-0C994CF864F7}" dt="2022-11-19T22:06:27.289" v="23" actId="1076"/>
+          <ac:cxnSpMkLst>
+            <pc:docMk/>
+            <pc:sldMk cId="2395916845" sldId="256"/>
+            <ac:cxnSpMk id="65" creationId="{30073670-C4D0-B8BE-179E-D8332EC070E8}"/>
+          </ac:cxnSpMkLst>
+        </pc:cxnChg>
+        <pc:cxnChg chg="mod">
+          <ac:chgData name="Flavio Martins Da Cruz" userId="7dbe8e30-2e97-43ef-8040-520ddcc14afe" providerId="ADAL" clId="{8BD699FA-D9F7-437C-B571-0C994CF864F7}" dt="2022-11-19T22:06:27.289" v="23" actId="1076"/>
+          <ac:cxnSpMkLst>
+            <pc:docMk/>
+            <pc:sldMk cId="2395916845" sldId="256"/>
+            <ac:cxnSpMk id="66" creationId="{CA100E5C-E8FE-DDEB-5AB9-5538FCD7B866}"/>
+          </ac:cxnSpMkLst>
+        </pc:cxnChg>
+        <pc:cxnChg chg="mod">
+          <ac:chgData name="Flavio Martins Da Cruz" userId="7dbe8e30-2e97-43ef-8040-520ddcc14afe" providerId="ADAL" clId="{8BD699FA-D9F7-437C-B571-0C994CF864F7}" dt="2022-11-19T22:06:27.289" v="23" actId="1076"/>
+          <ac:cxnSpMkLst>
+            <pc:docMk/>
+            <pc:sldMk cId="2395916845" sldId="256"/>
+            <ac:cxnSpMk id="67" creationId="{7566C93B-ABB7-3DA5-43E5-3114B2A2C01F}"/>
+          </ac:cxnSpMkLst>
+        </pc:cxnChg>
+        <pc:cxnChg chg="mod">
+          <ac:chgData name="Flavio Martins Da Cruz" userId="7dbe8e30-2e97-43ef-8040-520ddcc14afe" providerId="ADAL" clId="{8BD699FA-D9F7-437C-B571-0C994CF864F7}" dt="2022-11-19T22:06:27.289" v="23" actId="1076"/>
+          <ac:cxnSpMkLst>
+            <pc:docMk/>
+            <pc:sldMk cId="2395916845" sldId="256"/>
+            <ac:cxnSpMk id="68" creationId="{A4A56361-DC8B-B2ED-124F-041B4554F4BF}"/>
+          </ac:cxnSpMkLst>
+        </pc:cxnChg>
+        <pc:cxnChg chg="mod">
+          <ac:chgData name="Flavio Martins Da Cruz" userId="7dbe8e30-2e97-43ef-8040-520ddcc14afe" providerId="ADAL" clId="{8BD699FA-D9F7-437C-B571-0C994CF864F7}" dt="2022-11-19T22:06:27.289" v="23" actId="1076"/>
+          <ac:cxnSpMkLst>
+            <pc:docMk/>
+            <pc:sldMk cId="2395916845" sldId="256"/>
+            <ac:cxnSpMk id="69" creationId="{1CCDECBF-8D94-F936-E449-1E73CEA6EC33}"/>
+          </ac:cxnSpMkLst>
+        </pc:cxnChg>
+        <pc:cxnChg chg="mod">
+          <ac:chgData name="Flavio Martins Da Cruz" userId="7dbe8e30-2e97-43ef-8040-520ddcc14afe" providerId="ADAL" clId="{8BD699FA-D9F7-437C-B571-0C994CF864F7}" dt="2022-11-19T22:06:27.289" v="23" actId="1076"/>
+          <ac:cxnSpMkLst>
+            <pc:docMk/>
+            <pc:sldMk cId="2395916845" sldId="256"/>
+            <ac:cxnSpMk id="70" creationId="{588D99B9-3E74-3AED-1ACA-EFF779BC7F2C}"/>
+          </ac:cxnSpMkLst>
+        </pc:cxnChg>
+        <pc:cxnChg chg="mod">
+          <ac:chgData name="Flavio Martins Da Cruz" userId="7dbe8e30-2e97-43ef-8040-520ddcc14afe" providerId="ADAL" clId="{8BD699FA-D9F7-437C-B571-0C994CF864F7}" dt="2022-11-19T22:06:27.289" v="23" actId="1076"/>
+          <ac:cxnSpMkLst>
+            <pc:docMk/>
+            <pc:sldMk cId="2395916845" sldId="256"/>
+            <ac:cxnSpMk id="73" creationId="{0FCCB4F4-DB0A-9321-A747-49166180622A}"/>
+          </ac:cxnSpMkLst>
+        </pc:cxnChg>
+        <pc:cxnChg chg="mod">
+          <ac:chgData name="Flavio Martins Da Cruz" userId="7dbe8e30-2e97-43ef-8040-520ddcc14afe" providerId="ADAL" clId="{8BD699FA-D9F7-437C-B571-0C994CF864F7}" dt="2022-11-19T22:06:27.289" v="23" actId="1076"/>
+          <ac:cxnSpMkLst>
+            <pc:docMk/>
+            <pc:sldMk cId="2395916845" sldId="256"/>
+            <ac:cxnSpMk id="76" creationId="{96E538A7-8A5B-93CE-5488-F6F65C033C65}"/>
+          </ac:cxnSpMkLst>
+        </pc:cxnChg>
+        <pc:cxnChg chg="mod">
+          <ac:chgData name="Flavio Martins Da Cruz" userId="7dbe8e30-2e97-43ef-8040-520ddcc14afe" providerId="ADAL" clId="{8BD699FA-D9F7-437C-B571-0C994CF864F7}" dt="2022-11-19T22:06:27.289" v="23" actId="1076"/>
+          <ac:cxnSpMkLst>
+            <pc:docMk/>
+            <pc:sldMk cId="2395916845" sldId="256"/>
+            <ac:cxnSpMk id="79" creationId="{D272DB7B-A536-8EF7-4FD2-41715E02F7A9}"/>
+          </ac:cxnSpMkLst>
+        </pc:cxnChg>
+      </pc:sldChg>
+    </pc:docChg>
+  </pc:docChgLst>
   <pc:docChgLst>
     <pc:chgData name="Flavio Martins Da Cruz" userId="7dbe8e30-2e97-43ef-8040-520ddcc14afe" providerId="ADAL" clId="{D2BFB781-41E8-44D7-8625-CC045B935F9E}"/>
     <pc:docChg chg="undo custSel modSld">
@@ -545,7 +865,7 @@
           <a:p>
             <a:fld id="{0DA3BD58-FCCD-47AE-8964-E1D78058AAED}" type="datetimeFigureOut">
               <a:rPr lang="pt-BR" smtClean="0"/>
-              <a:t>07/10/2022</a:t>
+              <a:t>19/11/2022</a:t>
             </a:fld>
             <a:endParaRPr lang="pt-BR"/>
           </a:p>
@@ -715,7 +1035,7 @@
           <a:p>
             <a:fld id="{0DA3BD58-FCCD-47AE-8964-E1D78058AAED}" type="datetimeFigureOut">
               <a:rPr lang="pt-BR" smtClean="0"/>
-              <a:t>07/10/2022</a:t>
+              <a:t>19/11/2022</a:t>
             </a:fld>
             <a:endParaRPr lang="pt-BR"/>
           </a:p>
@@ -895,7 +1215,7 @@
           <a:p>
             <a:fld id="{0DA3BD58-FCCD-47AE-8964-E1D78058AAED}" type="datetimeFigureOut">
               <a:rPr lang="pt-BR" smtClean="0"/>
-              <a:t>07/10/2022</a:t>
+              <a:t>19/11/2022</a:t>
             </a:fld>
             <a:endParaRPr lang="pt-BR"/>
           </a:p>
@@ -1065,7 +1385,7 @@
           <a:p>
             <a:fld id="{0DA3BD58-FCCD-47AE-8964-E1D78058AAED}" type="datetimeFigureOut">
               <a:rPr lang="pt-BR" smtClean="0"/>
-              <a:t>07/10/2022</a:t>
+              <a:t>19/11/2022</a:t>
             </a:fld>
             <a:endParaRPr lang="pt-BR"/>
           </a:p>
@@ -1309,7 +1629,7 @@
           <a:p>
             <a:fld id="{0DA3BD58-FCCD-47AE-8964-E1D78058AAED}" type="datetimeFigureOut">
               <a:rPr lang="pt-BR" smtClean="0"/>
-              <a:t>07/10/2022</a:t>
+              <a:t>19/11/2022</a:t>
             </a:fld>
             <a:endParaRPr lang="pt-BR"/>
           </a:p>
@@ -1541,7 +1861,7 @@
           <a:p>
             <a:fld id="{0DA3BD58-FCCD-47AE-8964-E1D78058AAED}" type="datetimeFigureOut">
               <a:rPr lang="pt-BR" smtClean="0"/>
-              <a:t>07/10/2022</a:t>
+              <a:t>19/11/2022</a:t>
             </a:fld>
             <a:endParaRPr lang="pt-BR"/>
           </a:p>
@@ -1908,7 +2228,7 @@
           <a:p>
             <a:fld id="{0DA3BD58-FCCD-47AE-8964-E1D78058AAED}" type="datetimeFigureOut">
               <a:rPr lang="pt-BR" smtClean="0"/>
-              <a:t>07/10/2022</a:t>
+              <a:t>19/11/2022</a:t>
             </a:fld>
             <a:endParaRPr lang="pt-BR"/>
           </a:p>
@@ -2026,7 +2346,7 @@
           <a:p>
             <a:fld id="{0DA3BD58-FCCD-47AE-8964-E1D78058AAED}" type="datetimeFigureOut">
               <a:rPr lang="pt-BR" smtClean="0"/>
-              <a:t>07/10/2022</a:t>
+              <a:t>19/11/2022</a:t>
             </a:fld>
             <a:endParaRPr lang="pt-BR"/>
           </a:p>
@@ -2121,7 +2441,7 @@
           <a:p>
             <a:fld id="{0DA3BD58-FCCD-47AE-8964-E1D78058AAED}" type="datetimeFigureOut">
               <a:rPr lang="pt-BR" smtClean="0"/>
-              <a:t>07/10/2022</a:t>
+              <a:t>19/11/2022</a:t>
             </a:fld>
             <a:endParaRPr lang="pt-BR"/>
           </a:p>
@@ -2398,7 +2718,7 @@
           <a:p>
             <a:fld id="{0DA3BD58-FCCD-47AE-8964-E1D78058AAED}" type="datetimeFigureOut">
               <a:rPr lang="pt-BR" smtClean="0"/>
-              <a:t>07/10/2022</a:t>
+              <a:t>19/11/2022</a:t>
             </a:fld>
             <a:endParaRPr lang="pt-BR"/>
           </a:p>
@@ -2655,7 +2975,7 @@
           <a:p>
             <a:fld id="{0DA3BD58-FCCD-47AE-8964-E1D78058AAED}" type="datetimeFigureOut">
               <a:rPr lang="pt-BR" smtClean="0"/>
-              <a:t>07/10/2022</a:t>
+              <a:t>19/11/2022</a:t>
             </a:fld>
             <a:endParaRPr lang="pt-BR"/>
           </a:p>
@@ -2868,7 +3188,7 @@
           <a:p>
             <a:fld id="{0DA3BD58-FCCD-47AE-8964-E1D78058AAED}" type="datetimeFigureOut">
               <a:rPr lang="pt-BR" smtClean="0"/>
-              <a:t>07/10/2022</a:t>
+              <a:t>19/11/2022</a:t>
             </a:fld>
             <a:endParaRPr lang="pt-BR"/>
           </a:p>
@@ -3275,10 +3595,10 @@
       </p:grpSpPr>
       <p:pic>
         <p:nvPicPr>
-          <p:cNvPr id="5" name="Imagem 4">
+          <p:cNvPr id="3" name="Imagem 2">
             <a:extLst>
               <a:ext uri="{FF2B5EF4-FFF2-40B4-BE49-F238E27FC236}">
-                <a16:creationId xmlns:a16="http://schemas.microsoft.com/office/drawing/2014/main" id="{E22DD8CB-8FE8-7C8C-7206-5E678F220C1A}"/>
+                <a16:creationId xmlns:a16="http://schemas.microsoft.com/office/drawing/2014/main" id="{47541BB9-042E-3957-A965-AA5F9B88F1F4}"/>
               </a:ext>
             </a:extLst>
           </p:cNvPr>
@@ -3288,15 +3608,21 @@
           <p:nvPr/>
         </p:nvPicPr>
         <p:blipFill>
-          <a:blip r:embed="rId2"/>
+          <a:blip r:embed="rId2">
+            <a:extLst>
+              <a:ext uri="{28A0092B-C50C-407E-A947-70E740481C1C}">
+                <a14:useLocalDpi xmlns:a14="http://schemas.microsoft.com/office/drawing/2010/main" val="0"/>
+              </a:ext>
+            </a:extLst>
+          </a:blip>
           <a:stretch>
             <a:fillRect/>
           </a:stretch>
         </p:blipFill>
         <p:spPr>
           <a:xfrm>
-            <a:off x="4293981" y="2683916"/>
-            <a:ext cx="2310131" cy="1714703"/>
+            <a:off x="3404355" y="2737542"/>
+            <a:ext cx="2749185" cy="1552607"/>
           </a:xfrm>
           <a:prstGeom prst="rect">
             <a:avLst/>
@@ -3332,7 +3658,7 @@
         </p:blipFill>
         <p:spPr>
           <a:xfrm>
-            <a:off x="999572" y="2619654"/>
+            <a:off x="630546" y="2619654"/>
             <a:ext cx="2219797" cy="1778964"/>
           </a:xfrm>
           <a:prstGeom prst="rect">
@@ -3369,7 +3695,7 @@
         </p:blipFill>
         <p:spPr>
           <a:xfrm>
-            <a:off x="995543" y="5525992"/>
+            <a:off x="626517" y="5525992"/>
             <a:ext cx="2219797" cy="1981177"/>
           </a:xfrm>
           <a:prstGeom prst="rect">
@@ -3406,7 +3732,7 @@
         </p:blipFill>
         <p:spPr>
           <a:xfrm>
-            <a:off x="7652444" y="2896654"/>
+            <a:off x="8766475" y="2896654"/>
             <a:ext cx="2067486" cy="2521111"/>
           </a:xfrm>
           <a:prstGeom prst="rect">
@@ -3443,7 +3769,7 @@
         </p:blipFill>
         <p:spPr>
           <a:xfrm>
-            <a:off x="7675589" y="6365316"/>
+            <a:off x="8789620" y="6365316"/>
             <a:ext cx="2062886" cy="2266270"/>
           </a:xfrm>
           <a:prstGeom prst="rect">
@@ -3480,7 +3806,7 @@
         </p:blipFill>
         <p:spPr>
           <a:xfrm>
-            <a:off x="4312882" y="5662912"/>
+            <a:off x="3349288" y="5662912"/>
             <a:ext cx="2310130" cy="1819310"/>
           </a:xfrm>
           <a:prstGeom prst="rect">
@@ -3509,7 +3835,7 @@
         </p:nvSpPr>
         <p:spPr>
           <a:xfrm>
-            <a:off x="4819866" y="2287276"/>
+            <a:off x="4450840" y="2287276"/>
             <a:ext cx="1258358" cy="369332"/>
           </a:xfrm>
           <a:prstGeom prst="rect">
@@ -3544,7 +3870,7 @@
         </p:nvSpPr>
         <p:spPr>
           <a:xfrm>
-            <a:off x="1182773" y="2250322"/>
+            <a:off x="813747" y="2250322"/>
             <a:ext cx="1853392" cy="369332"/>
           </a:xfrm>
           <a:prstGeom prst="rect">
@@ -3579,7 +3905,7 @@
         </p:nvSpPr>
         <p:spPr>
           <a:xfrm>
-            <a:off x="1160379" y="5162926"/>
+            <a:off x="791353" y="5162926"/>
             <a:ext cx="1948034" cy="369332"/>
           </a:xfrm>
           <a:prstGeom prst="rect">
@@ -3614,7 +3940,7 @@
         </p:nvSpPr>
         <p:spPr>
           <a:xfrm>
-            <a:off x="7366440" y="2250323"/>
+            <a:off x="8480471" y="2250323"/>
             <a:ext cx="2537490" cy="646331"/>
           </a:xfrm>
           <a:prstGeom prst="rect">
@@ -3657,7 +3983,7 @@
         </p:nvSpPr>
         <p:spPr>
           <a:xfrm>
-            <a:off x="7498275" y="5995984"/>
+            <a:off x="8612306" y="5995984"/>
             <a:ext cx="2417521" cy="369332"/>
           </a:xfrm>
           <a:prstGeom prst="rect">
@@ -3693,7 +4019,7 @@
         </p:nvSpPr>
         <p:spPr>
           <a:xfrm>
-            <a:off x="4792016" y="5293580"/>
+            <a:off x="3828422" y="5293580"/>
             <a:ext cx="1422184" cy="369332"/>
           </a:xfrm>
           <a:prstGeom prst="rect">
@@ -3724,13 +4050,15 @@
               </a:ext>
             </a:extLst>
           </p:cNvPr>
-          <p:cNvCxnSpPr/>
+          <p:cNvCxnSpPr>
+            <a:cxnSpLocks/>
+          </p:cNvCxnSpPr>
           <p:nvPr/>
         </p:nvCxnSpPr>
         <p:spPr>
           <a:xfrm flipH="1">
-            <a:off x="3286126" y="3417887"/>
-            <a:ext cx="1285875" cy="0"/>
+            <a:off x="2917100" y="3417887"/>
+            <a:ext cx="688466" cy="0"/>
           </a:xfrm>
           <a:prstGeom prst="straightConnector1">
             <a:avLst/>
@@ -3776,8 +4104,8 @@
         </p:nvCxnSpPr>
         <p:spPr>
           <a:xfrm flipH="1">
-            <a:off x="3286125" y="3787220"/>
-            <a:ext cx="2057400" cy="1621392"/>
+            <a:off x="2917099" y="3729704"/>
+            <a:ext cx="1336411" cy="1678908"/>
           </a:xfrm>
           <a:prstGeom prst="straightConnector1">
             <a:avLst/>
@@ -3823,8 +4151,8 @@
         </p:nvCxnSpPr>
         <p:spPr>
           <a:xfrm>
-            <a:off x="6321002" y="3417887"/>
-            <a:ext cx="1285875" cy="0"/>
+            <a:off x="5263678" y="3417887"/>
+            <a:ext cx="3525942" cy="0"/>
           </a:xfrm>
           <a:prstGeom prst="straightConnector1">
             <a:avLst/>
@@ -3870,7 +4198,7 @@
         </p:nvCxnSpPr>
         <p:spPr>
           <a:xfrm flipH="1">
-            <a:off x="2400300" y="3826356"/>
+            <a:off x="2031274" y="3826356"/>
             <a:ext cx="266700" cy="1410806"/>
           </a:xfrm>
           <a:prstGeom prst="straightConnector1">
@@ -3917,8 +4245,8 @@
         </p:nvCxnSpPr>
         <p:spPr>
           <a:xfrm>
-            <a:off x="5247640" y="4398618"/>
-            <a:ext cx="0" cy="864607"/>
+            <a:off x="4253510" y="4313259"/>
+            <a:ext cx="0" cy="949966"/>
           </a:xfrm>
           <a:prstGeom prst="straightConnector1">
             <a:avLst/>
@@ -3964,7 +4292,7 @@
         </p:nvCxnSpPr>
         <p:spPr>
           <a:xfrm rot="5400000">
-            <a:off x="5930811" y="5571135"/>
+            <a:off x="7044842" y="5571135"/>
             <a:ext cx="3672095" cy="182536"/>
           </a:xfrm>
           <a:prstGeom prst="bentConnector4">
@@ -4014,7 +4342,7 @@
         </p:nvCxnSpPr>
         <p:spPr>
           <a:xfrm>
-            <a:off x="7429500" y="6572567"/>
+            <a:off x="8543531" y="6572567"/>
             <a:ext cx="246089" cy="0"/>
           </a:xfrm>
           <a:prstGeom prst="straightConnector1">
@@ -4060,7 +4388,7 @@
         </p:nvCxnSpPr>
         <p:spPr>
           <a:xfrm flipH="1">
-            <a:off x="7426960" y="4888550"/>
+            <a:off x="8540991" y="4888550"/>
             <a:ext cx="428627" cy="0"/>
           </a:xfrm>
           <a:prstGeom prst="line">
@@ -4107,7 +4435,7 @@
         </p:nvCxnSpPr>
         <p:spPr>
           <a:xfrm flipV="1">
-            <a:off x="7445180" y="4891090"/>
+            <a:off x="8559211" y="4891090"/>
             <a:ext cx="0" cy="1691637"/>
           </a:xfrm>
           <a:prstGeom prst="line">
@@ -4154,7 +4482,7 @@
         </p:nvCxnSpPr>
         <p:spPr>
           <a:xfrm>
-            <a:off x="7236634" y="7062251"/>
+            <a:off x="8350665" y="7062251"/>
             <a:ext cx="415810" cy="0"/>
           </a:xfrm>
           <a:prstGeom prst="straightConnector1">
@@ -4200,7 +4528,7 @@
         </p:nvCxnSpPr>
         <p:spPr>
           <a:xfrm flipH="1">
-            <a:off x="7225204" y="4290155"/>
+            <a:off x="8339235" y="4290155"/>
             <a:ext cx="618953" cy="0"/>
           </a:xfrm>
           <a:prstGeom prst="line">
@@ -4247,7 +4575,7 @@
         </p:nvCxnSpPr>
         <p:spPr>
           <a:xfrm flipV="1">
-            <a:off x="7236634" y="4294336"/>
+            <a:off x="8350665" y="4294336"/>
             <a:ext cx="0" cy="2784640"/>
           </a:xfrm>
           <a:prstGeom prst="line">
@@ -4294,7 +4622,7 @@
         </p:nvCxnSpPr>
         <p:spPr>
           <a:xfrm rot="16200000" flipH="1">
-            <a:off x="7819000" y="5579854"/>
+            <a:off x="8933031" y="5579854"/>
             <a:ext cx="3672095" cy="182536"/>
           </a:xfrm>
           <a:prstGeom prst="bentConnector4">
@@ -4344,7 +4672,7 @@
         </p:nvCxnSpPr>
         <p:spPr>
           <a:xfrm flipH="1">
-            <a:off x="9755208" y="6613605"/>
+            <a:off x="10869239" y="6613605"/>
             <a:ext cx="246089" cy="0"/>
           </a:xfrm>
           <a:prstGeom prst="straightConnector1">
@@ -4390,7 +4718,7 @@
         </p:nvCxnSpPr>
         <p:spPr>
           <a:xfrm>
-            <a:off x="9494520" y="4929588"/>
+            <a:off x="10608551" y="4929588"/>
             <a:ext cx="501697" cy="0"/>
           </a:xfrm>
           <a:prstGeom prst="line">
@@ -4437,7 +4765,7 @@
         </p:nvCxnSpPr>
         <p:spPr>
           <a:xfrm flipH="1" flipV="1">
-            <a:off x="9985617" y="4932128"/>
+            <a:off x="11099648" y="4932128"/>
             <a:ext cx="0" cy="1691637"/>
           </a:xfrm>
           <a:prstGeom prst="line">
@@ -4484,7 +4812,7 @@
         </p:nvCxnSpPr>
         <p:spPr>
           <a:xfrm flipH="1">
-            <a:off x="9746316" y="7062251"/>
+            <a:off x="10860347" y="7062251"/>
             <a:ext cx="415810" cy="0"/>
           </a:xfrm>
           <a:prstGeom prst="straightConnector1">
@@ -4530,7 +4858,7 @@
         </p:nvCxnSpPr>
         <p:spPr>
           <a:xfrm>
-            <a:off x="9494520" y="4313259"/>
+            <a:off x="10608551" y="4313259"/>
             <a:ext cx="673509" cy="0"/>
           </a:xfrm>
           <a:prstGeom prst="line">
@@ -4577,7 +4905,7 @@
         </p:nvCxnSpPr>
         <p:spPr>
           <a:xfrm flipH="1" flipV="1">
-            <a:off x="10162126" y="4294580"/>
+            <a:off x="11276157" y="4294580"/>
             <a:ext cx="0" cy="2784640"/>
           </a:xfrm>
           <a:prstGeom prst="line">
@@ -4624,7 +4952,7 @@
         </p:nvCxnSpPr>
         <p:spPr>
           <a:xfrm>
-            <a:off x="8876687" y="5035876"/>
+            <a:off x="9990718" y="5035876"/>
             <a:ext cx="0" cy="980231"/>
           </a:xfrm>
           <a:prstGeom prst="straightConnector1">
@@ -4671,7 +4999,7 @@
         </p:nvCxnSpPr>
         <p:spPr>
           <a:xfrm>
-            <a:off x="8695121" y="4465320"/>
+            <a:off x="9809152" y="4465320"/>
             <a:ext cx="0" cy="1550786"/>
           </a:xfrm>
           <a:prstGeom prst="straightConnector1">
@@ -4718,8 +5046,134 @@
         </p:nvCxnSpPr>
         <p:spPr>
           <a:xfrm>
-            <a:off x="8504621" y="3826355"/>
+            <a:off x="9618652" y="3826355"/>
             <a:ext cx="0" cy="2189751"/>
+          </a:xfrm>
+          <a:prstGeom prst="straightConnector1">
+            <a:avLst/>
+          </a:prstGeom>
+          <a:ln w="38100">
+            <a:solidFill>
+              <a:schemeClr val="bg2">
+                <a:lumMod val="25000"/>
+              </a:schemeClr>
+            </a:solidFill>
+            <a:headEnd type="oval" w="med" len="med"/>
+            <a:tailEnd type="triangle" w="med" len="med"/>
+          </a:ln>
+        </p:spPr>
+        <p:style>
+          <a:lnRef idx="1">
+            <a:schemeClr val="accent1"/>
+          </a:lnRef>
+          <a:fillRef idx="0">
+            <a:schemeClr val="accent1"/>
+          </a:fillRef>
+          <a:effectRef idx="0">
+            <a:schemeClr val="accent1"/>
+          </a:effectRef>
+          <a:fontRef idx="minor">
+            <a:schemeClr val="tx1"/>
+          </a:fontRef>
+        </p:style>
+      </p:cxnSp>
+      <p:pic>
+        <p:nvPicPr>
+          <p:cNvPr id="14" name="Imagem 13">
+            <a:extLst>
+              <a:ext uri="{FF2B5EF4-FFF2-40B4-BE49-F238E27FC236}">
+                <a16:creationId xmlns:a16="http://schemas.microsoft.com/office/drawing/2014/main" id="{90AC8568-23AC-3F98-5DF0-D27AAC52D91A}"/>
+              </a:ext>
+            </a:extLst>
+          </p:cNvPr>
+          <p:cNvPicPr>
+            <a:picLocks noChangeAspect="1"/>
+          </p:cNvPicPr>
+          <p:nvPr/>
+        </p:nvPicPr>
+        <p:blipFill>
+          <a:blip r:embed="rId8">
+            <a:extLst>
+              <a:ext uri="{28A0092B-C50C-407E-A947-70E740481C1C}">
+                <a14:useLocalDpi xmlns:a14="http://schemas.microsoft.com/office/drawing/2010/main" val="0"/>
+              </a:ext>
+            </a:extLst>
+          </a:blip>
+          <a:stretch>
+            <a:fillRect/>
+          </a:stretch>
+        </p:blipFill>
+        <p:spPr>
+          <a:xfrm>
+            <a:off x="5709198" y="7722248"/>
+            <a:ext cx="2310130" cy="1818675"/>
+          </a:xfrm>
+          <a:prstGeom prst="rect">
+            <a:avLst/>
+          </a:prstGeom>
+          <a:ln>
+            <a:solidFill>
+              <a:schemeClr val="bg1">
+                <a:lumMod val="65000"/>
+              </a:schemeClr>
+            </a:solidFill>
+          </a:ln>
+        </p:spPr>
+      </p:pic>
+      <p:sp>
+        <p:nvSpPr>
+          <p:cNvPr id="25" name="CaixaDeTexto 24">
+            <a:extLst>
+              <a:ext uri="{FF2B5EF4-FFF2-40B4-BE49-F238E27FC236}">
+                <a16:creationId xmlns:a16="http://schemas.microsoft.com/office/drawing/2014/main" id="{3592BA16-998F-4F54-DA25-302588758B15}"/>
+              </a:ext>
+            </a:extLst>
+          </p:cNvPr>
+          <p:cNvSpPr txBox="1"/>
+          <p:nvPr/>
+        </p:nvSpPr>
+        <p:spPr>
+          <a:xfrm>
+            <a:off x="6533388" y="7322503"/>
+            <a:ext cx="606256" cy="369332"/>
+          </a:xfrm>
+          <a:prstGeom prst="rect">
+            <a:avLst/>
+          </a:prstGeom>
+          <a:noFill/>
+        </p:spPr>
+        <p:txBody>
+          <a:bodyPr wrap="none" rtlCol="0">
+            <a:spAutoFit/>
+          </a:bodyPr>
+          <a:lstStyle/>
+          <a:p>
+            <a:pPr algn="ctr"/>
+            <a:r>
+              <a:rPr lang="pt-BR" dirty="0"/>
+              <a:t>Quiz</a:t>
+            </a:r>
+          </a:p>
+        </p:txBody>
+      </p:sp>
+      <p:cxnSp>
+        <p:nvCxnSpPr>
+          <p:cNvPr id="26" name="Conector de Seta Reta 25">
+            <a:extLst>
+              <a:ext uri="{FF2B5EF4-FFF2-40B4-BE49-F238E27FC236}">
+                <a16:creationId xmlns:a16="http://schemas.microsoft.com/office/drawing/2014/main" id="{6E21D379-3F43-3BAF-F904-E473FC365253}"/>
+              </a:ext>
+            </a:extLst>
+          </p:cNvPr>
+          <p:cNvCxnSpPr>
+            <a:cxnSpLocks/>
+          </p:cNvCxnSpPr>
+          <p:nvPr/>
+        </p:nvCxnSpPr>
+        <p:spPr>
+          <a:xfrm>
+            <a:off x="5709198" y="3729704"/>
+            <a:ext cx="1127318" cy="3592799"/>
           </a:xfrm>
           <a:prstGeom prst="straightConnector1">
             <a:avLst/>
@@ -5892,21 +6346,6 @@
 </file>
 
 <file path=customXml/item1.xml><?xml version="1.0" encoding="utf-8"?>
-<p:properties xmlns:p="http://schemas.microsoft.com/office/2006/metadata/properties" xmlns:xsi="http://www.w3.org/2001/XMLSchema-instance" xmlns:pc="http://schemas.microsoft.com/office/infopath/2007/PartnerControls">
-  <documentManagement/>
-</p:properties>
-</file>
-
-<file path=customXml/item2.xml><?xml version="1.0" encoding="utf-8"?>
-<?mso-contentType ?>
-<FormTemplates xmlns="http://schemas.microsoft.com/sharepoint/v3/contenttype/forms">
-  <Display>DocumentLibraryForm</Display>
-  <Edit>DocumentLibraryForm</Edit>
-  <New>DocumentLibraryForm</New>
-</FormTemplates>
-</file>
-
-<file path=customXml/item3.xml><?xml version="1.0" encoding="utf-8"?>
 <ct:contentTypeSchema xmlns:ct="http://schemas.microsoft.com/office/2006/metadata/contentType" xmlns:ma="http://schemas.microsoft.com/office/2006/metadata/properties/metaAttributes" ct:_="" ma:_="" ma:contentTypeName="Documento" ma:contentTypeID="0x010100DEB1892306AA484AB9D75A4CDF608FA6" ma:contentTypeVersion="4" ma:contentTypeDescription="Crie um novo documento." ma:contentTypeScope="" ma:versionID="396b07493731c5e6b2c35eac9345b5b2">
   <xsd:schema xmlns:xsd="http://www.w3.org/2001/XMLSchema" xmlns:xs="http://www.w3.org/2001/XMLSchema" xmlns:p="http://schemas.microsoft.com/office/2006/metadata/properties" xmlns:ns2="29422375-733d-49e6-bd76-29d3643b312c" targetNamespace="http://schemas.microsoft.com/office/2006/metadata/properties" ma:root="true" ma:fieldsID="54b59f98ec6c389047181fbb499016ac" ns2:_="">
     <xsd:import namespace="29422375-733d-49e6-bd76-29d3643b312c"/>
@@ -6050,24 +6489,22 @@
 </ct:contentTypeSchema>
 </file>
 
-<file path=customXml/itemProps1.xml><?xml version="1.0" encoding="utf-8"?>
-<ds:datastoreItem xmlns:ds="http://schemas.openxmlformats.org/officeDocument/2006/customXml" ds:itemID="{018BFCD5-755B-497F-8959-2A361FF8E605}">
-  <ds:schemaRefs>
-    <ds:schemaRef ds:uri="http://schemas.microsoft.com/office/2006/metadata/properties"/>
-    <ds:schemaRef ds:uri="http://schemas.microsoft.com/office/infopath/2007/PartnerControls"/>
-  </ds:schemaRefs>
-</ds:datastoreItem>
+<file path=customXml/item2.xml><?xml version="1.0" encoding="utf-8"?>
+<?mso-contentType ?>
+<FormTemplates xmlns="http://schemas.microsoft.com/sharepoint/v3/contenttype/forms">
+  <Display>DocumentLibraryForm</Display>
+  <Edit>DocumentLibraryForm</Edit>
+  <New>DocumentLibraryForm</New>
+</FormTemplates>
 </file>
 
-<file path=customXml/itemProps2.xml><?xml version="1.0" encoding="utf-8"?>
-<ds:datastoreItem xmlns:ds="http://schemas.openxmlformats.org/officeDocument/2006/customXml" ds:itemID="{4BCA8E21-EC9D-4C20-9C69-16A68CA4B33F}">
-  <ds:schemaRefs>
-    <ds:schemaRef ds:uri="http://schemas.microsoft.com/sharepoint/v3/contenttype/forms"/>
-  </ds:schemaRefs>
-</ds:datastoreItem>
+<file path=customXml/item3.xml><?xml version="1.0" encoding="utf-8"?>
+<p:properties xmlns:p="http://schemas.microsoft.com/office/2006/metadata/properties" xmlns:xsi="http://www.w3.org/2001/XMLSchema-instance" xmlns:pc="http://schemas.microsoft.com/office/infopath/2007/PartnerControls">
+  <documentManagement/>
+</p:properties>
 </file>
 
-<file path=customXml/itemProps3.xml><?xml version="1.0" encoding="utf-8"?>
+<file path=customXml/itemProps1.xml><?xml version="1.0" encoding="utf-8"?>
 <ds:datastoreItem xmlns:ds="http://schemas.openxmlformats.org/officeDocument/2006/customXml" ds:itemID="{8A6D5685-408E-4A1D-93A9-9BE8AF456DD3}">
   <ds:schemaRefs>
     <ds:schemaRef ds:uri="http://schemas.microsoft.com/office/2006/metadata/contentType"/>
@@ -6083,4 +6520,21 @@
     <ds:schemaRef ds:uri="http://schemas.microsoft.com/internal/obd"/>
   </ds:schemaRefs>
 </ds:datastoreItem>
+</file>
+
+<file path=customXml/itemProps2.xml><?xml version="1.0" encoding="utf-8"?>
+<ds:datastoreItem xmlns:ds="http://schemas.openxmlformats.org/officeDocument/2006/customXml" ds:itemID="{4BCA8E21-EC9D-4C20-9C69-16A68CA4B33F}">
+  <ds:schemaRefs>
+    <ds:schemaRef ds:uri="http://schemas.microsoft.com/sharepoint/v3/contenttype/forms"/>
+  </ds:schemaRefs>
+</ds:datastoreItem>
+</file>
+
+<file path=customXml/itemProps3.xml><?xml version="1.0" encoding="utf-8"?>
+<ds:datastoreItem xmlns:ds="http://schemas.openxmlformats.org/officeDocument/2006/customXml" ds:itemID="{018BFCD5-755B-497F-8959-2A361FF8E605}">
+  <ds:schemaRefs>
+    <ds:schemaRef ds:uri="http://schemas.microsoft.com/office/2006/metadata/properties"/>
+    <ds:schemaRef ds:uri="http://schemas.microsoft.com/office/infopath/2007/PartnerControls"/>
+  </ds:schemaRefs>
+</ds:datastoreItem>
 </file>
</xml_diff>

<commit_message>
Atualização do fluxo do usuário
</commit_message>
<xml_diff>
--- a/docs/Fluxo de usuário.pptx
+++ b/docs/Fluxo de usuário.pptx
@@ -116,7 +116,7 @@
 <file path=ppt/revisionInfo.xml><?xml version="1.0" encoding="utf-8"?>
 <p1510:revInfo xmlns:a="http://schemas.openxmlformats.org/drawingml/2006/main" xmlns:r="http://schemas.openxmlformats.org/officeDocument/2006/relationships" xmlns:p1510="http://schemas.microsoft.com/office/powerpoint/2015/10/main">
   <p1510:revLst>
-    <p1510:client id="{8BD699FA-D9F7-437C-B571-0C994CF864F7}" v="4" dt="2022-11-19T22:06:54.314"/>
+    <p1510:client id="{8BD699FA-D9F7-437C-B571-0C994CF864F7}" v="7" dt="2022-11-20T17:48:27.393"/>
   </p1510:revLst>
 </p1510:revInfo>
 </file>
@@ -126,12 +126,12 @@
   <pc:docChgLst>
     <pc:chgData name="Flavio Martins Da Cruz" userId="7dbe8e30-2e97-43ef-8040-520ddcc14afe" providerId="ADAL" clId="{8BD699FA-D9F7-437C-B571-0C994CF864F7}"/>
     <pc:docChg chg="undo custSel modSld">
-      <pc:chgData name="Flavio Martins Da Cruz" userId="7dbe8e30-2e97-43ef-8040-520ddcc14afe" providerId="ADAL" clId="{8BD699FA-D9F7-437C-B571-0C994CF864F7}" dt="2022-11-19T22:07:14.972" v="37" actId="14100"/>
+      <pc:chgData name="Flavio Martins Da Cruz" userId="7dbe8e30-2e97-43ef-8040-520ddcc14afe" providerId="ADAL" clId="{8BD699FA-D9F7-437C-B571-0C994CF864F7}" dt="2022-11-20T17:49:17.416" v="98" actId="1038"/>
       <pc:docMkLst>
         <pc:docMk/>
       </pc:docMkLst>
       <pc:sldChg chg="addSp delSp modSp mod">
-        <pc:chgData name="Flavio Martins Da Cruz" userId="7dbe8e30-2e97-43ef-8040-520ddcc14afe" providerId="ADAL" clId="{8BD699FA-D9F7-437C-B571-0C994CF864F7}" dt="2022-11-19T22:07:14.972" v="37" actId="14100"/>
+        <pc:chgData name="Flavio Martins Da Cruz" userId="7dbe8e30-2e97-43ef-8040-520ddcc14afe" providerId="ADAL" clId="{8BD699FA-D9F7-437C-B571-0C994CF864F7}" dt="2022-11-20T17:49:17.416" v="98" actId="1038"/>
         <pc:sldMkLst>
           <pc:docMk/>
           <pc:sldMk cId="2395916845" sldId="256"/>
@@ -177,7 +177,7 @@
           </ac:spMkLst>
         </pc:spChg>
         <pc:spChg chg="mod">
-          <ac:chgData name="Flavio Martins Da Cruz" userId="7dbe8e30-2e97-43ef-8040-520ddcc14afe" providerId="ADAL" clId="{8BD699FA-D9F7-437C-B571-0C994CF864F7}" dt="2022-11-19T22:06:32.608" v="24" actId="1076"/>
+          <ac:chgData name="Flavio Martins Da Cruz" userId="7dbe8e30-2e97-43ef-8040-520ddcc14afe" providerId="ADAL" clId="{8BD699FA-D9F7-437C-B571-0C994CF864F7}" dt="2022-11-20T17:39:45.582" v="39" actId="1076"/>
           <ac:spMkLst>
             <pc:docMk/>
             <pc:sldMk cId="2395916845" sldId="256"/>
@@ -185,7 +185,15 @@
           </ac:spMkLst>
         </pc:spChg>
         <pc:spChg chg="add mod">
-          <ac:chgData name="Flavio Martins Da Cruz" userId="7dbe8e30-2e97-43ef-8040-520ddcc14afe" providerId="ADAL" clId="{8BD699FA-D9F7-437C-B571-0C994CF864F7}" dt="2022-11-19T22:06:50.131" v="32" actId="20577"/>
+          <ac:chgData name="Flavio Martins Da Cruz" userId="7dbe8e30-2e97-43ef-8040-520ddcc14afe" providerId="ADAL" clId="{8BD699FA-D9F7-437C-B571-0C994CF864F7}" dt="2022-11-20T17:49:17.416" v="98" actId="1038"/>
+          <ac:spMkLst>
+            <pc:docMk/>
+            <pc:sldMk cId="2395916845" sldId="256"/>
+            <ac:spMk id="22" creationId="{7139AB3C-A11F-EFE9-F573-3F1144A98E4A}"/>
+          </ac:spMkLst>
+        </pc:spChg>
+        <pc:spChg chg="add mod">
+          <ac:chgData name="Flavio Martins Da Cruz" userId="7dbe8e30-2e97-43ef-8040-520ddcc14afe" providerId="ADAL" clId="{8BD699FA-D9F7-437C-B571-0C994CF864F7}" dt="2022-11-20T17:39:59.832" v="41" actId="1076"/>
           <ac:spMkLst>
             <pc:docMk/>
             <pc:sldMk cId="2395916845" sldId="256"/>
@@ -216,6 +224,14 @@
             <ac:picMk id="7" creationId="{806CD202-9324-B714-D05E-FFE5FF736DFC}"/>
           </ac:picMkLst>
         </pc:picChg>
+        <pc:picChg chg="add mod">
+          <ac:chgData name="Flavio Martins Da Cruz" userId="7dbe8e30-2e97-43ef-8040-520ddcc14afe" providerId="ADAL" clId="{8BD699FA-D9F7-437C-B571-0C994CF864F7}" dt="2022-11-20T17:49:17.416" v="98" actId="1038"/>
+          <ac:picMkLst>
+            <pc:docMk/>
+            <pc:sldMk cId="2395916845" sldId="256"/>
+            <ac:picMk id="8" creationId="{03F70BB1-8140-5F0E-6C01-72F32144754E}"/>
+          </ac:picMkLst>
+        </pc:picChg>
         <pc:picChg chg="mod">
           <ac:chgData name="Flavio Martins Da Cruz" userId="7dbe8e30-2e97-43ef-8040-520ddcc14afe" providerId="ADAL" clId="{8BD699FA-D9F7-437C-B571-0C994CF864F7}" dt="2022-11-19T22:06:32.608" v="24" actId="1076"/>
           <ac:picMkLst>
@@ -241,7 +257,7 @@
           </ac:picMkLst>
         </pc:picChg>
         <pc:picChg chg="add mod">
-          <ac:chgData name="Flavio Martins Da Cruz" userId="7dbe8e30-2e97-43ef-8040-520ddcc14afe" providerId="ADAL" clId="{8BD699FA-D9F7-437C-B571-0C994CF864F7}" dt="2022-11-19T22:06:42.912" v="26" actId="1076"/>
+          <ac:chgData name="Flavio Martins Da Cruz" userId="7dbe8e30-2e97-43ef-8040-520ddcc14afe" providerId="ADAL" clId="{8BD699FA-D9F7-437C-B571-0C994CF864F7}" dt="2022-11-20T17:39:59.832" v="41" actId="1076"/>
           <ac:picMkLst>
             <pc:docMk/>
             <pc:sldMk cId="2395916845" sldId="256"/>
@@ -249,13 +265,21 @@
           </ac:picMkLst>
         </pc:picChg>
         <pc:picChg chg="mod">
-          <ac:chgData name="Flavio Martins Da Cruz" userId="7dbe8e30-2e97-43ef-8040-520ddcc14afe" providerId="ADAL" clId="{8BD699FA-D9F7-437C-B571-0C994CF864F7}" dt="2022-11-19T22:06:32.608" v="24" actId="1076"/>
+          <ac:chgData name="Flavio Martins Da Cruz" userId="7dbe8e30-2e97-43ef-8040-520ddcc14afe" providerId="ADAL" clId="{8BD699FA-D9F7-437C-B571-0C994CF864F7}" dt="2022-11-20T17:39:45.582" v="39" actId="1076"/>
           <ac:picMkLst>
             <pc:docMk/>
             <pc:sldMk cId="2395916845" sldId="256"/>
             <ac:picMk id="15" creationId="{BFB783C5-2A2B-F993-B6C2-2BA1FA85125D}"/>
           </ac:picMkLst>
         </pc:picChg>
+        <pc:cxnChg chg="add mod">
+          <ac:chgData name="Flavio Martins Da Cruz" userId="7dbe8e30-2e97-43ef-8040-520ddcc14afe" providerId="ADAL" clId="{8BD699FA-D9F7-437C-B571-0C994CF864F7}" dt="2022-11-20T17:49:11.752" v="91" actId="14100"/>
+          <ac:cxnSpMkLst>
+            <pc:docMk/>
+            <pc:sldMk cId="2395916845" sldId="256"/>
+            <ac:cxnSpMk id="10" creationId="{D05BCCE7-4836-9B70-CEDD-D4A890373750}"/>
+          </ac:cxnSpMkLst>
+        </pc:cxnChg>
         <pc:cxnChg chg="mod">
           <ac:chgData name="Flavio Martins Da Cruz" userId="7dbe8e30-2e97-43ef-8040-520ddcc14afe" providerId="ADAL" clId="{8BD699FA-D9F7-437C-B571-0C994CF864F7}" dt="2022-11-19T22:06:32.608" v="24" actId="1076"/>
           <ac:cxnSpMkLst>
@@ -273,7 +297,7 @@
           </ac:cxnSpMkLst>
         </pc:cxnChg>
         <pc:cxnChg chg="add mod">
-          <ac:chgData name="Flavio Martins Da Cruz" userId="7dbe8e30-2e97-43ef-8040-520ddcc14afe" providerId="ADAL" clId="{8BD699FA-D9F7-437C-B571-0C994CF864F7}" dt="2022-11-19T22:07:02.198" v="35" actId="14100"/>
+          <ac:chgData name="Flavio Martins Da Cruz" userId="7dbe8e30-2e97-43ef-8040-520ddcc14afe" providerId="ADAL" clId="{8BD699FA-D9F7-437C-B571-0C994CF864F7}" dt="2022-11-20T17:40:02.396" v="42" actId="14100"/>
           <ac:cxnSpMkLst>
             <pc:docMk/>
             <pc:sldMk cId="2395916845" sldId="256"/>
@@ -297,7 +321,7 @@
           </ac:cxnSpMkLst>
         </pc:cxnChg>
         <pc:cxnChg chg="mod">
-          <ac:chgData name="Flavio Martins Da Cruz" userId="7dbe8e30-2e97-43ef-8040-520ddcc14afe" providerId="ADAL" clId="{8BD699FA-D9F7-437C-B571-0C994CF864F7}" dt="2022-11-19T22:06:32.608" v="24" actId="1076"/>
+          <ac:chgData name="Flavio Martins Da Cruz" userId="7dbe8e30-2e97-43ef-8040-520ddcc14afe" providerId="ADAL" clId="{8BD699FA-D9F7-437C-B571-0C994CF864F7}" dt="2022-11-20T17:39:48.869" v="40" actId="14100"/>
           <ac:cxnSpMkLst>
             <pc:docMk/>
             <pc:sldMk cId="2395916845" sldId="256"/>
@@ -865,7 +889,7 @@
           <a:p>
             <a:fld id="{0DA3BD58-FCCD-47AE-8964-E1D78058AAED}" type="datetimeFigureOut">
               <a:rPr lang="pt-BR" smtClean="0"/>
-              <a:t>19/11/2022</a:t>
+              <a:t>20/11/2022</a:t>
             </a:fld>
             <a:endParaRPr lang="pt-BR"/>
           </a:p>
@@ -1035,7 +1059,7 @@
           <a:p>
             <a:fld id="{0DA3BD58-FCCD-47AE-8964-E1D78058AAED}" type="datetimeFigureOut">
               <a:rPr lang="pt-BR" smtClean="0"/>
-              <a:t>19/11/2022</a:t>
+              <a:t>20/11/2022</a:t>
             </a:fld>
             <a:endParaRPr lang="pt-BR"/>
           </a:p>
@@ -1215,7 +1239,7 @@
           <a:p>
             <a:fld id="{0DA3BD58-FCCD-47AE-8964-E1D78058AAED}" type="datetimeFigureOut">
               <a:rPr lang="pt-BR" smtClean="0"/>
-              <a:t>19/11/2022</a:t>
+              <a:t>20/11/2022</a:t>
             </a:fld>
             <a:endParaRPr lang="pt-BR"/>
           </a:p>
@@ -1385,7 +1409,7 @@
           <a:p>
             <a:fld id="{0DA3BD58-FCCD-47AE-8964-E1D78058AAED}" type="datetimeFigureOut">
               <a:rPr lang="pt-BR" smtClean="0"/>
-              <a:t>19/11/2022</a:t>
+              <a:t>20/11/2022</a:t>
             </a:fld>
             <a:endParaRPr lang="pt-BR"/>
           </a:p>
@@ -1629,7 +1653,7 @@
           <a:p>
             <a:fld id="{0DA3BD58-FCCD-47AE-8964-E1D78058AAED}" type="datetimeFigureOut">
               <a:rPr lang="pt-BR" smtClean="0"/>
-              <a:t>19/11/2022</a:t>
+              <a:t>20/11/2022</a:t>
             </a:fld>
             <a:endParaRPr lang="pt-BR"/>
           </a:p>
@@ -1861,7 +1885,7 @@
           <a:p>
             <a:fld id="{0DA3BD58-FCCD-47AE-8964-E1D78058AAED}" type="datetimeFigureOut">
               <a:rPr lang="pt-BR" smtClean="0"/>
-              <a:t>19/11/2022</a:t>
+              <a:t>20/11/2022</a:t>
             </a:fld>
             <a:endParaRPr lang="pt-BR"/>
           </a:p>
@@ -2228,7 +2252,7 @@
           <a:p>
             <a:fld id="{0DA3BD58-FCCD-47AE-8964-E1D78058AAED}" type="datetimeFigureOut">
               <a:rPr lang="pt-BR" smtClean="0"/>
-              <a:t>19/11/2022</a:t>
+              <a:t>20/11/2022</a:t>
             </a:fld>
             <a:endParaRPr lang="pt-BR"/>
           </a:p>
@@ -2346,7 +2370,7 @@
           <a:p>
             <a:fld id="{0DA3BD58-FCCD-47AE-8964-E1D78058AAED}" type="datetimeFigureOut">
               <a:rPr lang="pt-BR" smtClean="0"/>
-              <a:t>19/11/2022</a:t>
+              <a:t>20/11/2022</a:t>
             </a:fld>
             <a:endParaRPr lang="pt-BR"/>
           </a:p>
@@ -2441,7 +2465,7 @@
           <a:p>
             <a:fld id="{0DA3BD58-FCCD-47AE-8964-E1D78058AAED}" type="datetimeFigureOut">
               <a:rPr lang="pt-BR" smtClean="0"/>
-              <a:t>19/11/2022</a:t>
+              <a:t>20/11/2022</a:t>
             </a:fld>
             <a:endParaRPr lang="pt-BR"/>
           </a:p>
@@ -2718,7 +2742,7 @@
           <a:p>
             <a:fld id="{0DA3BD58-FCCD-47AE-8964-E1D78058AAED}" type="datetimeFigureOut">
               <a:rPr lang="pt-BR" smtClean="0"/>
-              <a:t>19/11/2022</a:t>
+              <a:t>20/11/2022</a:t>
             </a:fld>
             <a:endParaRPr lang="pt-BR"/>
           </a:p>
@@ -2975,7 +2999,7 @@
           <a:p>
             <a:fld id="{0DA3BD58-FCCD-47AE-8964-E1D78058AAED}" type="datetimeFigureOut">
               <a:rPr lang="pt-BR" smtClean="0"/>
-              <a:t>19/11/2022</a:t>
+              <a:t>20/11/2022</a:t>
             </a:fld>
             <a:endParaRPr lang="pt-BR"/>
           </a:p>
@@ -3188,7 +3212,7 @@
           <a:p>
             <a:fld id="{0DA3BD58-FCCD-47AE-8964-E1D78058AAED}" type="datetimeFigureOut">
               <a:rPr lang="pt-BR" smtClean="0"/>
-              <a:t>19/11/2022</a:t>
+              <a:t>20/11/2022</a:t>
             </a:fld>
             <a:endParaRPr lang="pt-BR"/>
           </a:p>
@@ -3806,7 +3830,7 @@
         </p:blipFill>
         <p:spPr>
           <a:xfrm>
-            <a:off x="3349288" y="5662912"/>
+            <a:off x="3349288" y="5525992"/>
             <a:ext cx="2310130" cy="1819310"/>
           </a:xfrm>
           <a:prstGeom prst="rect">
@@ -4019,7 +4043,7 @@
         </p:nvSpPr>
         <p:spPr>
           <a:xfrm>
-            <a:off x="3828422" y="5293580"/>
+            <a:off x="3828422" y="5156660"/>
             <a:ext cx="1422184" cy="369332"/>
           </a:xfrm>
           <a:prstGeom prst="rect">
@@ -4246,7 +4270,7 @@
         <p:spPr>
           <a:xfrm>
             <a:off x="4253510" y="4313259"/>
-            <a:ext cx="0" cy="949966"/>
+            <a:ext cx="0" cy="923903"/>
           </a:xfrm>
           <a:prstGeom prst="straightConnector1">
             <a:avLst/>
@@ -5105,7 +5129,7 @@
         </p:blipFill>
         <p:spPr>
           <a:xfrm>
-            <a:off x="5709198" y="7722248"/>
+            <a:off x="5709198" y="8034064"/>
             <a:ext cx="2310130" cy="1818675"/>
           </a:xfrm>
           <a:prstGeom prst="rect">
@@ -5134,7 +5158,7 @@
         </p:nvSpPr>
         <p:spPr>
           <a:xfrm>
-            <a:off x="6533388" y="7322503"/>
+            <a:off x="6533388" y="7634319"/>
             <a:ext cx="606256" cy="369332"/>
           </a:xfrm>
           <a:prstGeom prst="rect">
@@ -5167,13 +5191,14 @@
           </p:cNvPr>
           <p:cNvCxnSpPr>
             <a:cxnSpLocks/>
+            <a:endCxn id="25" idx="0"/>
           </p:cNvCxnSpPr>
           <p:nvPr/>
         </p:nvCxnSpPr>
         <p:spPr>
           <a:xfrm>
             <a:off x="5709198" y="3729704"/>
-            <a:ext cx="1127318" cy="3592799"/>
+            <a:ext cx="1127318" cy="3904615"/>
           </a:xfrm>
           <a:prstGeom prst="straightConnector1">
             <a:avLst/>
@@ -5203,6 +5228,132 @@
           </a:fontRef>
         </p:style>
       </p:cxnSp>
+      <p:pic>
+        <p:nvPicPr>
+          <p:cNvPr id="8" name="Imagem 7" descr="Interface gráfica do usuário, Texto, Aplicativo, Email&#10;&#10;Descrição gerada automaticamente">
+            <a:extLst>
+              <a:ext uri="{FF2B5EF4-FFF2-40B4-BE49-F238E27FC236}">
+                <a16:creationId xmlns:a16="http://schemas.microsoft.com/office/drawing/2014/main" id="{03F70BB1-8140-5F0E-6C01-72F32144754E}"/>
+              </a:ext>
+            </a:extLst>
+          </p:cNvPr>
+          <p:cNvPicPr>
+            <a:picLocks noChangeAspect="1"/>
+          </p:cNvPicPr>
+          <p:nvPr/>
+        </p:nvPicPr>
+        <p:blipFill>
+          <a:blip r:embed="rId9">
+            <a:extLst>
+              <a:ext uri="{28A0092B-C50C-407E-A947-70E740481C1C}">
+                <a14:useLocalDpi xmlns:a14="http://schemas.microsoft.com/office/drawing/2010/main" val="0"/>
+              </a:ext>
+            </a:extLst>
+          </a:blip>
+          <a:stretch>
+            <a:fillRect/>
+          </a:stretch>
+        </p:blipFill>
+        <p:spPr>
+          <a:xfrm>
+            <a:off x="2492566" y="8003650"/>
+            <a:ext cx="2445367" cy="1922193"/>
+          </a:xfrm>
+          <a:prstGeom prst="rect">
+            <a:avLst/>
+          </a:prstGeom>
+          <a:ln>
+            <a:solidFill>
+              <a:schemeClr val="bg1">
+                <a:lumMod val="65000"/>
+              </a:schemeClr>
+            </a:solidFill>
+          </a:ln>
+        </p:spPr>
+      </p:pic>
+      <p:cxnSp>
+        <p:nvCxnSpPr>
+          <p:cNvPr id="10" name="Conector de Seta Reta 9">
+            <a:extLst>
+              <a:ext uri="{FF2B5EF4-FFF2-40B4-BE49-F238E27FC236}">
+                <a16:creationId xmlns:a16="http://schemas.microsoft.com/office/drawing/2014/main" id="{D05BCCE7-4836-9B70-CEDD-D4A890373750}"/>
+              </a:ext>
+            </a:extLst>
+          </p:cNvPr>
+          <p:cNvCxnSpPr>
+            <a:cxnSpLocks/>
+          </p:cNvCxnSpPr>
+          <p:nvPr/>
+        </p:nvCxnSpPr>
+        <p:spPr>
+          <a:xfrm flipH="1">
+            <a:off x="4982632" y="8943401"/>
+            <a:ext cx="726566" cy="0"/>
+          </a:xfrm>
+          <a:prstGeom prst="straightConnector1">
+            <a:avLst/>
+          </a:prstGeom>
+          <a:ln w="38100">
+            <a:solidFill>
+              <a:schemeClr val="bg2">
+                <a:lumMod val="25000"/>
+              </a:schemeClr>
+            </a:solidFill>
+            <a:headEnd type="oval" w="med" len="med"/>
+            <a:tailEnd type="triangle" w="med" len="med"/>
+          </a:ln>
+        </p:spPr>
+        <p:style>
+          <a:lnRef idx="1">
+            <a:schemeClr val="accent1"/>
+          </a:lnRef>
+          <a:fillRef idx="0">
+            <a:schemeClr val="accent1"/>
+          </a:fillRef>
+          <a:effectRef idx="0">
+            <a:schemeClr val="accent1"/>
+          </a:effectRef>
+          <a:fontRef idx="minor">
+            <a:schemeClr val="tx1"/>
+          </a:fontRef>
+        </p:style>
+      </p:cxnSp>
+      <p:sp>
+        <p:nvSpPr>
+          <p:cNvPr id="22" name="CaixaDeTexto 21">
+            <a:extLst>
+              <a:ext uri="{FF2B5EF4-FFF2-40B4-BE49-F238E27FC236}">
+                <a16:creationId xmlns:a16="http://schemas.microsoft.com/office/drawing/2014/main" id="{7139AB3C-A11F-EFE9-F573-3F1144A98E4A}"/>
+              </a:ext>
+            </a:extLst>
+          </p:cNvPr>
+          <p:cNvSpPr txBox="1"/>
+          <p:nvPr/>
+        </p:nvSpPr>
+        <p:spPr>
+          <a:xfrm>
+            <a:off x="2381206" y="7634319"/>
+            <a:ext cx="2654766" cy="369332"/>
+          </a:xfrm>
+          <a:prstGeom prst="rect">
+            <a:avLst/>
+          </a:prstGeom>
+          <a:noFill/>
+        </p:spPr>
+        <p:txBody>
+          <a:bodyPr wrap="none" rtlCol="0">
+            <a:spAutoFit/>
+          </a:bodyPr>
+          <a:lstStyle/>
+          <a:p>
+            <a:pPr algn="ctr"/>
+            <a:r>
+              <a:rPr lang="pt-BR" dirty="0"/>
+              <a:t>Comentários das questões</a:t>
+            </a:r>
+          </a:p>
+        </p:txBody>
+      </p:sp>
     </p:spTree>
     <p:extLst>
       <p:ext uri="{BB962C8B-B14F-4D97-AF65-F5344CB8AC3E}">
@@ -6346,6 +6497,21 @@
 </file>
 
 <file path=customXml/item1.xml><?xml version="1.0" encoding="utf-8"?>
+<p:properties xmlns:p="http://schemas.microsoft.com/office/2006/metadata/properties" xmlns:xsi="http://www.w3.org/2001/XMLSchema-instance" xmlns:pc="http://schemas.microsoft.com/office/infopath/2007/PartnerControls">
+  <documentManagement/>
+</p:properties>
+</file>
+
+<file path=customXml/item2.xml><?xml version="1.0" encoding="utf-8"?>
+<?mso-contentType ?>
+<FormTemplates xmlns="http://schemas.microsoft.com/sharepoint/v3/contenttype/forms">
+  <Display>DocumentLibraryForm</Display>
+  <Edit>DocumentLibraryForm</Edit>
+  <New>DocumentLibraryForm</New>
+</FormTemplates>
+</file>
+
+<file path=customXml/item3.xml><?xml version="1.0" encoding="utf-8"?>
 <ct:contentTypeSchema xmlns:ct="http://schemas.microsoft.com/office/2006/metadata/contentType" xmlns:ma="http://schemas.microsoft.com/office/2006/metadata/properties/metaAttributes" ct:_="" ma:_="" ma:contentTypeName="Documento" ma:contentTypeID="0x010100DEB1892306AA484AB9D75A4CDF608FA6" ma:contentTypeVersion="4" ma:contentTypeDescription="Crie um novo documento." ma:contentTypeScope="" ma:versionID="396b07493731c5e6b2c35eac9345b5b2">
   <xsd:schema xmlns:xsd="http://www.w3.org/2001/XMLSchema" xmlns:xs="http://www.w3.org/2001/XMLSchema" xmlns:p="http://schemas.microsoft.com/office/2006/metadata/properties" xmlns:ns2="29422375-733d-49e6-bd76-29d3643b312c" targetNamespace="http://schemas.microsoft.com/office/2006/metadata/properties" ma:root="true" ma:fieldsID="54b59f98ec6c389047181fbb499016ac" ns2:_="">
     <xsd:import namespace="29422375-733d-49e6-bd76-29d3643b312c"/>
@@ -6489,22 +6655,24 @@
 </ct:contentTypeSchema>
 </file>
 
-<file path=customXml/item2.xml><?xml version="1.0" encoding="utf-8"?>
-<?mso-contentType ?>
-<FormTemplates xmlns="http://schemas.microsoft.com/sharepoint/v3/contenttype/forms">
-  <Display>DocumentLibraryForm</Display>
-  <Edit>DocumentLibraryForm</Edit>
-  <New>DocumentLibraryForm</New>
-</FormTemplates>
+<file path=customXml/itemProps1.xml><?xml version="1.0" encoding="utf-8"?>
+<ds:datastoreItem xmlns:ds="http://schemas.openxmlformats.org/officeDocument/2006/customXml" ds:itemID="{018BFCD5-755B-497F-8959-2A361FF8E605}">
+  <ds:schemaRefs>
+    <ds:schemaRef ds:uri="http://schemas.microsoft.com/office/2006/metadata/properties"/>
+    <ds:schemaRef ds:uri="http://schemas.microsoft.com/office/infopath/2007/PartnerControls"/>
+  </ds:schemaRefs>
+</ds:datastoreItem>
 </file>
 
-<file path=customXml/item3.xml><?xml version="1.0" encoding="utf-8"?>
-<p:properties xmlns:p="http://schemas.microsoft.com/office/2006/metadata/properties" xmlns:xsi="http://www.w3.org/2001/XMLSchema-instance" xmlns:pc="http://schemas.microsoft.com/office/infopath/2007/PartnerControls">
-  <documentManagement/>
-</p:properties>
+<file path=customXml/itemProps2.xml><?xml version="1.0" encoding="utf-8"?>
+<ds:datastoreItem xmlns:ds="http://schemas.openxmlformats.org/officeDocument/2006/customXml" ds:itemID="{4BCA8E21-EC9D-4C20-9C69-16A68CA4B33F}">
+  <ds:schemaRefs>
+    <ds:schemaRef ds:uri="http://schemas.microsoft.com/sharepoint/v3/contenttype/forms"/>
+  </ds:schemaRefs>
+</ds:datastoreItem>
 </file>
 
-<file path=customXml/itemProps1.xml><?xml version="1.0" encoding="utf-8"?>
+<file path=customXml/itemProps3.xml><?xml version="1.0" encoding="utf-8"?>
 <ds:datastoreItem xmlns:ds="http://schemas.openxmlformats.org/officeDocument/2006/customXml" ds:itemID="{8A6D5685-408E-4A1D-93A9-9BE8AF456DD3}">
   <ds:schemaRefs>
     <ds:schemaRef ds:uri="http://schemas.microsoft.com/office/2006/metadata/contentType"/>
@@ -6520,21 +6688,4 @@
     <ds:schemaRef ds:uri="http://schemas.microsoft.com/internal/obd"/>
   </ds:schemaRefs>
 </ds:datastoreItem>
-</file>
-
-<file path=customXml/itemProps2.xml><?xml version="1.0" encoding="utf-8"?>
-<ds:datastoreItem xmlns:ds="http://schemas.openxmlformats.org/officeDocument/2006/customXml" ds:itemID="{4BCA8E21-EC9D-4C20-9C69-16A68CA4B33F}">
-  <ds:schemaRefs>
-    <ds:schemaRef ds:uri="http://schemas.microsoft.com/sharepoint/v3/contenttype/forms"/>
-  </ds:schemaRefs>
-</ds:datastoreItem>
-</file>
-
-<file path=customXml/itemProps3.xml><?xml version="1.0" encoding="utf-8"?>
-<ds:datastoreItem xmlns:ds="http://schemas.openxmlformats.org/officeDocument/2006/customXml" ds:itemID="{018BFCD5-755B-497F-8959-2A361FF8E605}">
-  <ds:schemaRefs>
-    <ds:schemaRef ds:uri="http://schemas.microsoft.com/office/2006/metadata/properties"/>
-    <ds:schemaRef ds:uri="http://schemas.microsoft.com/office/infopath/2007/PartnerControls"/>
-  </ds:schemaRefs>
-</ds:datastoreItem>
 </file>
</xml_diff>